<commit_message>
Started slides content and minor poster changes
</commit_message>
<xml_diff>
--- a/presentation/slides.pptx
+++ b/presentation/slides.pptx
@@ -4,6 +4,9 @@
   <p:sldMasterIdLst>
     <p:sldMasterId id="2147483648" r:id="rId1"/>
   </p:sldMasterIdLst>
+  <p:handoutMasterIdLst>
+    <p:handoutMasterId r:id="rId10"/>
+  </p:handoutMasterIdLst>
   <p:sldIdLst>
     <p:sldId id="256" r:id="rId2"/>
     <p:sldId id="257" r:id="rId3"/>
@@ -114,6 +117,166 @@
 </p:presentation>
 </file>
 
+<file path=ppt/handoutMasters/handoutMaster1.xml><?xml version="1.0" encoding="utf-8"?>
+<p:handoutMaster xmlns:a="http://schemas.openxmlformats.org/drawingml/2006/main" xmlns:r="http://schemas.openxmlformats.org/officeDocument/2006/relationships" xmlns:p="http://schemas.openxmlformats.org/presentationml/2006/main">
+  <p:cSld>
+    <p:bg>
+      <p:bgRef idx="1001">
+        <a:schemeClr val="bg1"/>
+      </p:bgRef>
+    </p:bg>
+    <p:spTree>
+      <p:nvGrpSpPr>
+        <p:cNvPr id="1" name=""/>
+        <p:cNvGrpSpPr/>
+        <p:nvPr/>
+      </p:nvGrpSpPr>
+      <p:grpSpPr>
+        <a:xfrm>
+          <a:off x="0" y="0"/>
+          <a:ext cx="0" cy="0"/>
+          <a:chOff x="0" y="0"/>
+          <a:chExt cx="0" cy="0"/>
+        </a:xfrm>
+      </p:grpSpPr>
+      <p:sp>
+        <p:nvSpPr>
+          <p:cNvPr id="2" name="Header Placeholder 1"/>
+          <p:cNvSpPr>
+            <a:spLocks noGrp="1"/>
+          </p:cNvSpPr>
+          <p:nvPr>
+            <p:ph type="hdr" sz="quarter"/>
+          </p:nvPr>
+        </p:nvSpPr>
+        <p:spPr>
+          <a:xfrm>
+            <a:off x="0" y="0"/>
+            <a:ext cx="2971800" cy="457200"/>
+          </a:xfrm>
+          <a:prstGeom prst="rect">
+            <a:avLst/>
+          </a:prstGeom>
+        </p:spPr>
+        <p:txBody>
+          <a:bodyPr vert="horz" lIns="91440" tIns="45720" rIns="91440" bIns="45720" rtlCol="0"/>
+          <a:lstStyle>
+            <a:lvl1pPr algn="l">
+              <a:defRPr sz="1200"/>
+            </a:lvl1pPr>
+          </a:lstStyle>
+          <a:p>
+            <a:endParaRPr lang="en-GB"/>
+          </a:p>
+        </p:txBody>
+      </p:sp>
+      <p:sp>
+        <p:nvSpPr>
+          <p:cNvPr id="3" name="Date Placeholder 2"/>
+          <p:cNvSpPr>
+            <a:spLocks noGrp="1"/>
+          </p:cNvSpPr>
+          <p:nvPr>
+            <p:ph type="dt" sz="quarter" idx="1"/>
+          </p:nvPr>
+        </p:nvSpPr>
+        <p:spPr>
+          <a:xfrm>
+            <a:off x="3884613" y="0"/>
+            <a:ext cx="2971800" cy="457200"/>
+          </a:xfrm>
+          <a:prstGeom prst="rect">
+            <a:avLst/>
+          </a:prstGeom>
+        </p:spPr>
+        <p:txBody>
+          <a:bodyPr vert="horz" lIns="91440" tIns="45720" rIns="91440" bIns="45720" rtlCol="0"/>
+          <a:lstStyle>
+            <a:lvl1pPr algn="r">
+              <a:defRPr sz="1200"/>
+            </a:lvl1pPr>
+          </a:lstStyle>
+          <a:p>
+            <a:fld id="{8F9A1DBC-8C61-41BD-94B9-870336526AAD}" type="datetimeFigureOut">
+              <a:rPr lang="en-GB" smtClean="0"/>
+              <a:t>06/05/2014</a:t>
+            </a:fld>
+            <a:endParaRPr lang="en-GB"/>
+          </a:p>
+        </p:txBody>
+      </p:sp>
+      <p:sp>
+        <p:nvSpPr>
+          <p:cNvPr id="4" name="Footer Placeholder 3"/>
+          <p:cNvSpPr>
+            <a:spLocks noGrp="1"/>
+          </p:cNvSpPr>
+          <p:nvPr>
+            <p:ph type="ftr" sz="quarter" idx="2"/>
+          </p:nvPr>
+        </p:nvSpPr>
+        <p:spPr>
+          <a:xfrm>
+            <a:off x="0" y="8685213"/>
+            <a:ext cx="2971800" cy="457200"/>
+          </a:xfrm>
+          <a:prstGeom prst="rect">
+            <a:avLst/>
+          </a:prstGeom>
+        </p:spPr>
+        <p:txBody>
+          <a:bodyPr vert="horz" lIns="91440" tIns="45720" rIns="91440" bIns="45720" rtlCol="0" anchor="b"/>
+          <a:lstStyle>
+            <a:lvl1pPr algn="l">
+              <a:defRPr sz="1200"/>
+            </a:lvl1pPr>
+          </a:lstStyle>
+          <a:p>
+            <a:endParaRPr lang="en-GB"/>
+          </a:p>
+        </p:txBody>
+      </p:sp>
+      <p:sp>
+        <p:nvSpPr>
+          <p:cNvPr id="5" name="Slide Number Placeholder 4"/>
+          <p:cNvSpPr>
+            <a:spLocks noGrp="1"/>
+          </p:cNvSpPr>
+          <p:nvPr>
+            <p:ph type="sldNum" sz="quarter" idx="3"/>
+          </p:nvPr>
+        </p:nvSpPr>
+        <p:spPr>
+          <a:xfrm>
+            <a:off x="3884613" y="8685213"/>
+            <a:ext cx="2971800" cy="457200"/>
+          </a:xfrm>
+          <a:prstGeom prst="rect">
+            <a:avLst/>
+          </a:prstGeom>
+        </p:spPr>
+        <p:txBody>
+          <a:bodyPr vert="horz" lIns="91440" tIns="45720" rIns="91440" bIns="45720" rtlCol="0" anchor="b"/>
+          <a:lstStyle>
+            <a:lvl1pPr algn="r">
+              <a:defRPr sz="1200"/>
+            </a:lvl1pPr>
+          </a:lstStyle>
+          <a:p>
+            <a:fld id="{1362DCA0-93F1-48C7-A7DC-CBB499102833}" type="slidenum">
+              <a:rPr lang="en-GB" smtClean="0"/>
+              <a:t>‹#›</a:t>
+            </a:fld>
+            <a:endParaRPr lang="en-GB"/>
+          </a:p>
+        </p:txBody>
+      </p:sp>
+    </p:spTree>
+  </p:cSld>
+  <p:clrMap bg1="lt1" tx1="dk1" bg2="lt2" tx2="dk2" accent1="accent1" accent2="accent2" accent3="accent3" accent4="accent4" accent5="accent5" accent6="accent6" hlink="hlink" folHlink="folHlink"/>
+</p:handoutMaster>
+</file>
+
 <file path=ppt/slideLayouts/slideLayout1.xml><?xml version="1.0" encoding="utf-8"?>
 <p:sldLayout xmlns:a="http://schemas.openxmlformats.org/drawingml/2006/main" xmlns:r="http://schemas.openxmlformats.org/officeDocument/2006/relationships" xmlns:p="http://schemas.openxmlformats.org/presentationml/2006/main" type="title" preserve="1">
   <p:cSld name="Title Slide">
@@ -295,7 +458,8 @@
           <a:p>
             <a:fld id="{B27620D7-7890-418F-9270-4BAB042765A0}" type="datetimeFigureOut">
               <a:rPr lang="en-GB" smtClean="0"/>
-              <a:t>29/04/2014</a:t>
+              <a:pPr/>
+              <a:t>06/05/2014</a:t>
             </a:fld>
             <a:endParaRPr lang="en-GB"/>
           </a:p>
@@ -337,6 +501,7 @@
           <a:p>
             <a:fld id="{321E7509-3787-47F3-8594-CD2B99B68E44}" type="slidenum">
               <a:rPr lang="en-GB" smtClean="0"/>
+              <a:pPr/>
               <a:t>‹#›</a:t>
             </a:fld>
             <a:endParaRPr lang="en-GB"/>
@@ -460,7 +625,8 @@
           <a:p>
             <a:fld id="{B27620D7-7890-418F-9270-4BAB042765A0}" type="datetimeFigureOut">
               <a:rPr lang="en-GB" smtClean="0"/>
-              <a:t>29/04/2014</a:t>
+              <a:pPr/>
+              <a:t>06/05/2014</a:t>
             </a:fld>
             <a:endParaRPr lang="en-GB"/>
           </a:p>
@@ -502,6 +668,7 @@
           <a:p>
             <a:fld id="{321E7509-3787-47F3-8594-CD2B99B68E44}" type="slidenum">
               <a:rPr lang="en-GB" smtClean="0"/>
+              <a:pPr/>
               <a:t>‹#›</a:t>
             </a:fld>
             <a:endParaRPr lang="en-GB"/>
@@ -635,7 +802,8 @@
           <a:p>
             <a:fld id="{B27620D7-7890-418F-9270-4BAB042765A0}" type="datetimeFigureOut">
               <a:rPr lang="en-GB" smtClean="0"/>
-              <a:t>29/04/2014</a:t>
+              <a:pPr/>
+              <a:t>06/05/2014</a:t>
             </a:fld>
             <a:endParaRPr lang="en-GB"/>
           </a:p>
@@ -677,6 +845,7 @@
           <a:p>
             <a:fld id="{321E7509-3787-47F3-8594-CD2B99B68E44}" type="slidenum">
               <a:rPr lang="en-GB" smtClean="0"/>
+              <a:pPr/>
               <a:t>‹#›</a:t>
             </a:fld>
             <a:endParaRPr lang="en-GB"/>
@@ -800,7 +969,8 @@
           <a:p>
             <a:fld id="{B27620D7-7890-418F-9270-4BAB042765A0}" type="datetimeFigureOut">
               <a:rPr lang="en-GB" smtClean="0"/>
-              <a:t>29/04/2014</a:t>
+              <a:pPr/>
+              <a:t>06/05/2014</a:t>
             </a:fld>
             <a:endParaRPr lang="en-GB"/>
           </a:p>
@@ -842,6 +1012,7 @@
           <a:p>
             <a:fld id="{321E7509-3787-47F3-8594-CD2B99B68E44}" type="slidenum">
               <a:rPr lang="en-GB" smtClean="0"/>
+              <a:pPr/>
               <a:t>‹#›</a:t>
             </a:fld>
             <a:endParaRPr lang="en-GB"/>
@@ -1041,7 +1212,8 @@
           <a:p>
             <a:fld id="{B27620D7-7890-418F-9270-4BAB042765A0}" type="datetimeFigureOut">
               <a:rPr lang="en-GB" smtClean="0"/>
-              <a:t>29/04/2014</a:t>
+              <a:pPr/>
+              <a:t>06/05/2014</a:t>
             </a:fld>
             <a:endParaRPr lang="en-GB"/>
           </a:p>
@@ -1083,6 +1255,7 @@
           <a:p>
             <a:fld id="{321E7509-3787-47F3-8594-CD2B99B68E44}" type="slidenum">
               <a:rPr lang="en-GB" smtClean="0"/>
+              <a:pPr/>
               <a:t>‹#›</a:t>
             </a:fld>
             <a:endParaRPr lang="en-GB"/>
@@ -1324,7 +1497,8 @@
           <a:p>
             <a:fld id="{B27620D7-7890-418F-9270-4BAB042765A0}" type="datetimeFigureOut">
               <a:rPr lang="en-GB" smtClean="0"/>
-              <a:t>29/04/2014</a:t>
+              <a:pPr/>
+              <a:t>06/05/2014</a:t>
             </a:fld>
             <a:endParaRPr lang="en-GB"/>
           </a:p>
@@ -1366,6 +1540,7 @@
           <a:p>
             <a:fld id="{321E7509-3787-47F3-8594-CD2B99B68E44}" type="slidenum">
               <a:rPr lang="en-GB" smtClean="0"/>
+              <a:pPr/>
               <a:t>‹#›</a:t>
             </a:fld>
             <a:endParaRPr lang="en-GB"/>
@@ -1741,7 +1916,8 @@
           <a:p>
             <a:fld id="{B27620D7-7890-418F-9270-4BAB042765A0}" type="datetimeFigureOut">
               <a:rPr lang="en-GB" smtClean="0"/>
-              <a:t>29/04/2014</a:t>
+              <a:pPr/>
+              <a:t>06/05/2014</a:t>
             </a:fld>
             <a:endParaRPr lang="en-GB"/>
           </a:p>
@@ -1783,6 +1959,7 @@
           <a:p>
             <a:fld id="{321E7509-3787-47F3-8594-CD2B99B68E44}" type="slidenum">
               <a:rPr lang="en-GB" smtClean="0"/>
+              <a:pPr/>
               <a:t>‹#›</a:t>
             </a:fld>
             <a:endParaRPr lang="en-GB"/>
@@ -1854,7 +2031,8 @@
           <a:p>
             <a:fld id="{B27620D7-7890-418F-9270-4BAB042765A0}" type="datetimeFigureOut">
               <a:rPr lang="en-GB" smtClean="0"/>
-              <a:t>29/04/2014</a:t>
+              <a:pPr/>
+              <a:t>06/05/2014</a:t>
             </a:fld>
             <a:endParaRPr lang="en-GB"/>
           </a:p>
@@ -1896,6 +2074,7 @@
           <a:p>
             <a:fld id="{321E7509-3787-47F3-8594-CD2B99B68E44}" type="slidenum">
               <a:rPr lang="en-GB" smtClean="0"/>
+              <a:pPr/>
               <a:t>‹#›</a:t>
             </a:fld>
             <a:endParaRPr lang="en-GB"/>
@@ -1944,7 +2123,8 @@
           <a:p>
             <a:fld id="{B27620D7-7890-418F-9270-4BAB042765A0}" type="datetimeFigureOut">
               <a:rPr lang="en-GB" smtClean="0"/>
-              <a:t>29/04/2014</a:t>
+              <a:pPr/>
+              <a:t>06/05/2014</a:t>
             </a:fld>
             <a:endParaRPr lang="en-GB"/>
           </a:p>
@@ -1986,6 +2166,7 @@
           <a:p>
             <a:fld id="{321E7509-3787-47F3-8594-CD2B99B68E44}" type="slidenum">
               <a:rPr lang="en-GB" smtClean="0"/>
+              <a:pPr/>
               <a:t>‹#›</a:t>
             </a:fld>
             <a:endParaRPr lang="en-GB"/>
@@ -2216,7 +2397,8 @@
           <a:p>
             <a:fld id="{B27620D7-7890-418F-9270-4BAB042765A0}" type="datetimeFigureOut">
               <a:rPr lang="en-GB" smtClean="0"/>
-              <a:t>29/04/2014</a:t>
+              <a:pPr/>
+              <a:t>06/05/2014</a:t>
             </a:fld>
             <a:endParaRPr lang="en-GB"/>
           </a:p>
@@ -2258,6 +2440,7 @@
           <a:p>
             <a:fld id="{321E7509-3787-47F3-8594-CD2B99B68E44}" type="slidenum">
               <a:rPr lang="en-GB" smtClean="0"/>
+              <a:pPr/>
               <a:t>‹#›</a:t>
             </a:fld>
             <a:endParaRPr lang="en-GB"/>
@@ -2464,7 +2647,8 @@
           <a:p>
             <a:fld id="{B27620D7-7890-418F-9270-4BAB042765A0}" type="datetimeFigureOut">
               <a:rPr lang="en-GB" smtClean="0"/>
-              <a:t>29/04/2014</a:t>
+              <a:pPr/>
+              <a:t>06/05/2014</a:t>
             </a:fld>
             <a:endParaRPr lang="en-GB"/>
           </a:p>
@@ -2506,6 +2690,7 @@
           <a:p>
             <a:fld id="{321E7509-3787-47F3-8594-CD2B99B68E44}" type="slidenum">
               <a:rPr lang="en-GB" smtClean="0"/>
+              <a:pPr/>
               <a:t>‹#›</a:t>
             </a:fld>
             <a:endParaRPr lang="en-GB"/>
@@ -2602,38 +2787,38 @@
           <a:p>
             <a:pPr lvl="0"/>
             <a:r>
-              <a:rPr lang="en-US" smtClean="0"/>
+              <a:rPr lang="en-US" dirty="0" smtClean="0"/>
               <a:t>Click to edit Master text styles</a:t>
             </a:r>
           </a:p>
           <a:p>
             <a:pPr lvl="1"/>
             <a:r>
-              <a:rPr lang="en-US" smtClean="0"/>
+              <a:rPr lang="en-US" dirty="0" smtClean="0"/>
               <a:t>Second level</a:t>
             </a:r>
           </a:p>
           <a:p>
             <a:pPr lvl="2"/>
             <a:r>
-              <a:rPr lang="en-US" smtClean="0"/>
+              <a:rPr lang="en-US" dirty="0" smtClean="0"/>
               <a:t>Third level</a:t>
             </a:r>
           </a:p>
           <a:p>
             <a:pPr lvl="3"/>
             <a:r>
-              <a:rPr lang="en-US" smtClean="0"/>
+              <a:rPr lang="en-US" dirty="0" smtClean="0"/>
               <a:t>Fourth level</a:t>
             </a:r>
           </a:p>
           <a:p>
             <a:pPr lvl="4"/>
             <a:r>
-              <a:rPr lang="en-US" smtClean="0"/>
+              <a:rPr lang="en-US" dirty="0" smtClean="0"/>
               <a:t>Fifth level</a:t>
             </a:r>
-            <a:endParaRPr lang="en-GB"/>
+            <a:endParaRPr lang="en-GB" dirty="0"/>
           </a:p>
         </p:txBody>
       </p:sp>
@@ -2672,7 +2857,8 @@
           <a:p>
             <a:fld id="{B27620D7-7890-418F-9270-4BAB042765A0}" type="datetimeFigureOut">
               <a:rPr lang="en-GB" smtClean="0"/>
-              <a:t>29/04/2014</a:t>
+              <a:pPr/>
+              <a:t>06/05/2014</a:t>
             </a:fld>
             <a:endParaRPr lang="en-GB"/>
           </a:p>
@@ -2750,6 +2936,7 @@
           <a:p>
             <a:fld id="{321E7509-3787-47F3-8594-CD2B99B68E44}" type="slidenum">
               <a:rPr lang="en-GB" smtClean="0"/>
+              <a:pPr/>
               <a:t>‹#›</a:t>
             </a:fld>
             <a:endParaRPr lang="en-GB"/>
@@ -3427,7 +3614,7 @@
         </p:spPr>
         <p:txBody>
           <a:bodyPr>
-            <a:normAutofit/>
+            <a:noAutofit/>
           </a:bodyPr>
           <a:lstStyle/>
           <a:p>
@@ -3436,12 +3623,120 @@
               <a:buChar char="−"/>
             </a:pPr>
             <a:r>
-              <a:rPr lang="en-GB" dirty="0" smtClean="0">
-                <a:latin typeface="Garamond" pitchFamily="18" charset="0"/>
-              </a:rPr>
-              <a:t>Hello</a:t>
-            </a:r>
-            <a:endParaRPr lang="en-GB" dirty="0">
+              <a:rPr lang="en-GB" sz="2800" dirty="0" smtClean="0">
+                <a:latin typeface="Garamond" pitchFamily="18" charset="0"/>
+              </a:rPr>
+              <a:t>Internet video traffic is growing</a:t>
+            </a:r>
+          </a:p>
+          <a:p>
+            <a:pPr>
+              <a:buFont typeface="Garamond" pitchFamily="18" charset="0"/>
+              <a:buChar char="−"/>
+            </a:pPr>
+            <a:r>
+              <a:rPr lang="en-GB" sz="2800" dirty="0" smtClean="0">
+                <a:latin typeface="Garamond" pitchFamily="18" charset="0"/>
+              </a:rPr>
+              <a:t>Many devices </a:t>
+            </a:r>
+            <a:r>
+              <a:rPr lang="en-GB" sz="2800" dirty="0" smtClean="0">
+                <a:latin typeface="Garamond" pitchFamily="18" charset="0"/>
+              </a:rPr>
+              <a:t>and </a:t>
+            </a:r>
+            <a:r>
+              <a:rPr lang="en-GB" sz="2800" dirty="0" smtClean="0">
+                <a:latin typeface="Garamond" pitchFamily="18" charset="0"/>
+              </a:rPr>
+              <a:t>platforms should be supported</a:t>
+            </a:r>
+          </a:p>
+          <a:p>
+            <a:pPr>
+              <a:buFont typeface="Garamond" pitchFamily="18" charset="0"/>
+              <a:buChar char="−"/>
+            </a:pPr>
+            <a:r>
+              <a:rPr lang="en-GB" sz="2800" dirty="0" smtClean="0">
+                <a:latin typeface="Garamond" pitchFamily="18" charset="0"/>
+              </a:rPr>
+              <a:t>Historically achieved using </a:t>
+            </a:r>
+            <a:r>
+              <a:rPr lang="en-GB" sz="2800" dirty="0" smtClean="0">
+                <a:latin typeface="Garamond" pitchFamily="18" charset="0"/>
+              </a:rPr>
+              <a:t>third party </a:t>
+            </a:r>
+            <a:r>
+              <a:rPr lang="en-GB" sz="2800" dirty="0" smtClean="0">
+                <a:latin typeface="Garamond" pitchFamily="18" charset="0"/>
+              </a:rPr>
+              <a:t>plug-ins</a:t>
+            </a:r>
+          </a:p>
+          <a:p>
+            <a:pPr>
+              <a:buFont typeface="Garamond" pitchFamily="18" charset="0"/>
+              <a:buChar char="−"/>
+            </a:pPr>
+            <a:r>
+              <a:rPr lang="en-GB" sz="2800" dirty="0" smtClean="0">
+                <a:latin typeface="Garamond" pitchFamily="18" charset="0"/>
+              </a:rPr>
+              <a:t>HTML5 </a:t>
+            </a:r>
+            <a:r>
+              <a:rPr lang="en-GB" sz="2800" dirty="0" smtClean="0">
+                <a:latin typeface="Garamond" pitchFamily="18" charset="0"/>
+              </a:rPr>
+              <a:t>enables videos to be embedded directly </a:t>
+            </a:r>
+            <a:r>
+              <a:rPr lang="en-GB" sz="2800" dirty="0" smtClean="0">
+                <a:latin typeface="Garamond" pitchFamily="18" charset="0"/>
+              </a:rPr>
+              <a:t>into web pages</a:t>
+            </a:r>
+          </a:p>
+          <a:p>
+            <a:pPr>
+              <a:buFont typeface="Garamond" pitchFamily="18" charset="0"/>
+              <a:buChar char="−"/>
+            </a:pPr>
+            <a:r>
+              <a:rPr lang="en-GB" sz="2800" dirty="0" smtClean="0">
+                <a:latin typeface="Garamond" pitchFamily="18" charset="0"/>
+              </a:rPr>
+              <a:t>However</a:t>
+            </a:r>
+            <a:r>
+              <a:rPr lang="en-GB" sz="2800" dirty="0" smtClean="0">
+                <a:latin typeface="Garamond" pitchFamily="18" charset="0"/>
+              </a:rPr>
+              <a:t>, </a:t>
+            </a:r>
+            <a:r>
+              <a:rPr lang="en-GB" sz="2800" dirty="0" smtClean="0">
+                <a:latin typeface="Garamond" pitchFamily="18" charset="0"/>
+              </a:rPr>
+              <a:t>to be adopted </a:t>
+            </a:r>
+            <a:r>
+              <a:rPr lang="en-GB" sz="2800" dirty="0" smtClean="0">
+                <a:latin typeface="Garamond" pitchFamily="18" charset="0"/>
+              </a:rPr>
+              <a:t>it must support the features already offered by </a:t>
+            </a:r>
+            <a:r>
+              <a:rPr lang="en-GB" sz="2800" dirty="0" smtClean="0">
+                <a:latin typeface="Garamond" pitchFamily="18" charset="0"/>
+              </a:rPr>
+              <a:t>traditional approaches </a:t>
+            </a:r>
+            <a:endParaRPr lang="en-GB" sz="2800" dirty="0">
               <a:latin typeface="Garamond" pitchFamily="18" charset="0"/>
             </a:endParaRPr>
           </a:p>
@@ -3615,7 +3910,7 @@
         </p:spPr>
         <p:txBody>
           <a:bodyPr>
-            <a:normAutofit/>
+            <a:noAutofit/>
           </a:bodyPr>
           <a:lstStyle/>
           <a:p>
@@ -3624,10 +3919,73 @@
               <a:buChar char="−"/>
             </a:pPr>
             <a:r>
-              <a:rPr lang="en-GB" dirty="0" smtClean="0">
-                <a:latin typeface="Garamond" pitchFamily="18" charset="0"/>
-              </a:rPr>
-              <a:t>Hello</a:t>
+              <a:rPr lang="en-GB" sz="2800" dirty="0" smtClean="0">
+                <a:latin typeface="Garamond" pitchFamily="18" charset="0"/>
+              </a:rPr>
+              <a:t>Plug-in approaches render content in a black box and can have problems with missing plug-ins</a:t>
+            </a:r>
+          </a:p>
+          <a:p>
+            <a:pPr>
+              <a:buFont typeface="Garamond" pitchFamily="18" charset="0"/>
+              <a:buChar char="−"/>
+            </a:pPr>
+            <a:r>
+              <a:rPr lang="en-GB" sz="2800" dirty="0" smtClean="0">
+                <a:latin typeface="Garamond" pitchFamily="18" charset="0"/>
+              </a:rPr>
+              <a:t>HTML5 video solves these problems</a:t>
+            </a:r>
+            <a:endParaRPr lang="en-GB" sz="2800" dirty="0" smtClean="0">
+              <a:latin typeface="Garamond" pitchFamily="18" charset="0"/>
+            </a:endParaRPr>
+          </a:p>
+          <a:p>
+            <a:pPr>
+              <a:buFont typeface="Garamond" pitchFamily="18" charset="0"/>
+              <a:buChar char="−"/>
+            </a:pPr>
+            <a:r>
+              <a:rPr lang="en-GB" sz="2800" dirty="0" smtClean="0">
+                <a:latin typeface="Garamond" pitchFamily="18" charset="0"/>
+              </a:rPr>
+              <a:t>HTML5 </a:t>
+            </a:r>
+            <a:r>
+              <a:rPr lang="en-GB" sz="2800" dirty="0" smtClean="0">
+                <a:latin typeface="Garamond" pitchFamily="18" charset="0"/>
+              </a:rPr>
+              <a:t>video does not specify which formats should be supported, leading to differences between </a:t>
+            </a:r>
+            <a:r>
+              <a:rPr lang="en-GB" sz="2800" dirty="0" smtClean="0">
+                <a:latin typeface="Garamond" pitchFamily="18" charset="0"/>
+              </a:rPr>
+              <a:t>implementations</a:t>
+            </a:r>
+          </a:p>
+          <a:p>
+            <a:pPr>
+              <a:buFont typeface="Garamond" pitchFamily="18" charset="0"/>
+              <a:buChar char="−"/>
+            </a:pPr>
+            <a:r>
+              <a:rPr lang="en-GB" sz="2800" dirty="0" smtClean="0">
+                <a:latin typeface="Garamond" pitchFamily="18" charset="0"/>
+              </a:rPr>
+              <a:t>Developers can define multiple ‘sources’ for </a:t>
+            </a:r>
+            <a:r>
+              <a:rPr lang="en-GB" sz="2800" dirty="0" smtClean="0">
+                <a:latin typeface="Garamond" pitchFamily="18" charset="0"/>
+              </a:rPr>
+              <a:t>each </a:t>
+            </a:r>
+            <a:r>
+              <a:rPr lang="en-GB" sz="2800" dirty="0" smtClean="0">
+                <a:latin typeface="Garamond" pitchFamily="18" charset="0"/>
+              </a:rPr>
+              <a:t>video</a:t>
             </a:r>
             <a:endParaRPr lang="en-GB" dirty="0">
               <a:latin typeface="Garamond" pitchFamily="18" charset="0"/>
@@ -3803,7 +4161,7 @@
         </p:spPr>
         <p:txBody>
           <a:bodyPr>
-            <a:normAutofit/>
+            <a:noAutofit/>
           </a:bodyPr>
           <a:lstStyle/>
           <a:p>
@@ -3812,14 +4170,128 @@
               <a:buChar char="−"/>
             </a:pPr>
             <a:r>
-              <a:rPr lang="en-GB" dirty="0" smtClean="0">
-                <a:latin typeface="Garamond" pitchFamily="18" charset="0"/>
-              </a:rPr>
-              <a:t>Hello</a:t>
-            </a:r>
-            <a:endParaRPr lang="en-GB" dirty="0">
+              <a:rPr lang="en-GB" sz="2800" dirty="0" smtClean="0">
+                <a:latin typeface="Garamond" pitchFamily="18" charset="0"/>
+              </a:rPr>
+              <a:t>Push or pull-based methods</a:t>
+            </a:r>
+          </a:p>
+          <a:p>
+            <a:pPr>
+              <a:buFont typeface="Garamond" pitchFamily="18" charset="0"/>
+              <a:buChar char="−"/>
+            </a:pPr>
+            <a:r>
+              <a:rPr lang="en-GB" sz="2800" dirty="0" smtClean="0">
+                <a:latin typeface="Garamond" pitchFamily="18" charset="0"/>
+              </a:rPr>
+              <a:t>Plug-in </a:t>
+            </a:r>
+            <a:r>
+              <a:rPr lang="en-GB" sz="2800" dirty="0" smtClean="0">
+                <a:latin typeface="Garamond" pitchFamily="18" charset="0"/>
+              </a:rPr>
+              <a:t>based approaches use </a:t>
+            </a:r>
+            <a:r>
+              <a:rPr lang="en-GB" sz="2800" dirty="0" smtClean="0">
+                <a:latin typeface="Garamond" pitchFamily="18" charset="0"/>
+              </a:rPr>
+              <a:t>both</a:t>
+            </a:r>
+          </a:p>
+          <a:p>
+            <a:pPr>
+              <a:buFont typeface="Garamond" pitchFamily="18" charset="0"/>
+              <a:buChar char="−"/>
+            </a:pPr>
+            <a:r>
+              <a:rPr lang="en-GB" sz="2800" dirty="0" smtClean="0">
+                <a:latin typeface="Garamond" pitchFamily="18" charset="0"/>
+              </a:rPr>
+              <a:t>HTML5 </a:t>
+            </a:r>
+            <a:r>
+              <a:rPr lang="en-GB" sz="2800" dirty="0" smtClean="0">
+                <a:latin typeface="Garamond" pitchFamily="18" charset="0"/>
+              </a:rPr>
+              <a:t>video typically uses </a:t>
+            </a:r>
+            <a:r>
+              <a:rPr lang="en-GB" sz="2800" dirty="0" smtClean="0">
+                <a:latin typeface="Garamond" pitchFamily="18" charset="0"/>
+              </a:rPr>
+              <a:t>pull-based</a:t>
+            </a:r>
+          </a:p>
+          <a:p>
+            <a:pPr>
+              <a:buFont typeface="Garamond" pitchFamily="18" charset="0"/>
+              <a:buChar char="−"/>
+            </a:pPr>
+            <a:r>
+              <a:rPr lang="en-GB" sz="2800" dirty="0" smtClean="0">
+                <a:latin typeface="Garamond" pitchFamily="18" charset="0"/>
+              </a:rPr>
+              <a:t>Both methods support </a:t>
+            </a:r>
+            <a:r>
+              <a:rPr lang="en-GB" sz="2800" dirty="0" smtClean="0">
+                <a:latin typeface="Garamond" pitchFamily="18" charset="0"/>
+              </a:rPr>
+              <a:t>adaptive </a:t>
+            </a:r>
+            <a:r>
+              <a:rPr lang="en-GB" sz="2800" dirty="0" smtClean="0">
+                <a:latin typeface="Garamond" pitchFamily="18" charset="0"/>
+              </a:rPr>
+              <a:t>streaming</a:t>
+            </a:r>
+            <a:endParaRPr lang="en-GB" sz="2800" dirty="0" smtClean="0">
               <a:latin typeface="Garamond" pitchFamily="18" charset="0"/>
             </a:endParaRPr>
+          </a:p>
+          <a:p>
+            <a:pPr>
+              <a:buFont typeface="Garamond" pitchFamily="18" charset="0"/>
+              <a:buChar char="−"/>
+            </a:pPr>
+            <a:r>
+              <a:rPr lang="en-GB" sz="2800" dirty="0" smtClean="0">
+                <a:latin typeface="Garamond" pitchFamily="18" charset="0"/>
+              </a:rPr>
+              <a:t>O</a:t>
+            </a:r>
+            <a:r>
+              <a:rPr lang="en-GB" sz="2800" dirty="0" smtClean="0">
+                <a:latin typeface="Garamond" pitchFamily="18" charset="0"/>
+              </a:rPr>
+              <a:t>n-demand </a:t>
+            </a:r>
+            <a:r>
+              <a:rPr lang="en-GB" sz="2800" dirty="0" smtClean="0">
+                <a:latin typeface="Garamond" pitchFamily="18" charset="0"/>
+              </a:rPr>
+              <a:t>media and live </a:t>
+            </a:r>
+            <a:r>
+              <a:rPr lang="en-GB" sz="2800" dirty="0" smtClean="0">
+                <a:latin typeface="Garamond" pitchFamily="18" charset="0"/>
+              </a:rPr>
+              <a:t>media should be supported</a:t>
+            </a:r>
+          </a:p>
+          <a:p>
+            <a:pPr>
+              <a:buFont typeface="Garamond" pitchFamily="18" charset="0"/>
+              <a:buChar char="−"/>
+            </a:pPr>
+            <a:r>
+              <a:rPr lang="en-GB" sz="2800" dirty="0" smtClean="0">
+                <a:latin typeface="Garamond" pitchFamily="18" charset="0"/>
+              </a:rPr>
+              <a:t>Solutions exist for both plug-in based and HTML 5 video approaches</a:t>
+            </a:r>
           </a:p>
         </p:txBody>
       </p:sp>
@@ -3991,7 +4463,7 @@
         </p:spPr>
         <p:txBody>
           <a:bodyPr>
-            <a:normAutofit/>
+            <a:noAutofit/>
           </a:bodyPr>
           <a:lstStyle/>
           <a:p>
@@ -4000,12 +4472,120 @@
               <a:buChar char="−"/>
             </a:pPr>
             <a:r>
-              <a:rPr lang="en-GB" dirty="0" smtClean="0">
-                <a:latin typeface="Garamond" pitchFamily="18" charset="0"/>
-              </a:rPr>
-              <a:t>Hello</a:t>
-            </a:r>
-            <a:endParaRPr lang="en-GB" dirty="0">
+              <a:rPr lang="en-GB" sz="2800" dirty="0" smtClean="0">
+                <a:latin typeface="Garamond" pitchFamily="18" charset="0"/>
+              </a:rPr>
+              <a:t>Delivered video content can </a:t>
+            </a:r>
+            <a:r>
+              <a:rPr lang="en-GB" sz="2800" dirty="0" smtClean="0">
+                <a:latin typeface="Garamond" pitchFamily="18" charset="0"/>
+              </a:rPr>
+              <a:t>be </a:t>
+            </a:r>
+            <a:r>
+              <a:rPr lang="en-GB" sz="2800" dirty="0" smtClean="0">
+                <a:latin typeface="Garamond" pitchFamily="18" charset="0"/>
+              </a:rPr>
+              <a:t>captured</a:t>
+            </a:r>
+          </a:p>
+          <a:p>
+            <a:pPr>
+              <a:buFont typeface="Garamond" pitchFamily="18" charset="0"/>
+              <a:buChar char="−"/>
+            </a:pPr>
+            <a:r>
+              <a:rPr lang="en-GB" sz="2800" dirty="0" smtClean="0">
+                <a:latin typeface="Garamond" pitchFamily="18" charset="0"/>
+              </a:rPr>
+              <a:t>Methods exist to try and prevent this</a:t>
+            </a:r>
+          </a:p>
+          <a:p>
+            <a:pPr>
+              <a:buFont typeface="Garamond" pitchFamily="18" charset="0"/>
+              <a:buChar char="−"/>
+            </a:pPr>
+            <a:r>
+              <a:rPr lang="en-GB" sz="2800" dirty="0" smtClean="0">
+                <a:latin typeface="Garamond" pitchFamily="18" charset="0"/>
+              </a:rPr>
+              <a:t>If </a:t>
+            </a:r>
+            <a:r>
+              <a:rPr lang="en-GB" sz="2800" dirty="0" smtClean="0">
+                <a:latin typeface="Garamond" pitchFamily="18" charset="0"/>
+              </a:rPr>
+              <a:t>a user </a:t>
+            </a:r>
+            <a:r>
+              <a:rPr lang="en-GB" sz="2800" dirty="0" smtClean="0">
+                <a:latin typeface="Garamond" pitchFamily="18" charset="0"/>
+              </a:rPr>
+              <a:t>captures the video </a:t>
+            </a:r>
+            <a:r>
+              <a:rPr lang="en-GB" sz="2800" dirty="0" smtClean="0">
+                <a:latin typeface="Garamond" pitchFamily="18" charset="0"/>
+              </a:rPr>
+              <a:t>DRM technologies can be used to prevent </a:t>
+            </a:r>
+            <a:r>
+              <a:rPr lang="en-GB" sz="2800" dirty="0" smtClean="0">
+                <a:latin typeface="Garamond" pitchFamily="18" charset="0"/>
+              </a:rPr>
+              <a:t>playback</a:t>
+            </a:r>
+          </a:p>
+          <a:p>
+            <a:pPr>
+              <a:buFont typeface="Garamond" pitchFamily="18" charset="0"/>
+              <a:buChar char="−"/>
+            </a:pPr>
+            <a:r>
+              <a:rPr lang="en-GB" sz="2800" dirty="0" smtClean="0">
+                <a:latin typeface="Garamond" pitchFamily="18" charset="0"/>
+              </a:rPr>
+              <a:t>HTML5 </a:t>
+            </a:r>
+            <a:r>
+              <a:rPr lang="en-GB" sz="2800" dirty="0" smtClean="0">
+                <a:latin typeface="Garamond" pitchFamily="18" charset="0"/>
+              </a:rPr>
+              <a:t>does not specify a DRM </a:t>
+            </a:r>
+            <a:r>
+              <a:rPr lang="en-GB" sz="2800" dirty="0" smtClean="0">
+                <a:latin typeface="Garamond" pitchFamily="18" charset="0"/>
+              </a:rPr>
+              <a:t>system</a:t>
+            </a:r>
+          </a:p>
+          <a:p>
+            <a:pPr>
+              <a:buFont typeface="Garamond" pitchFamily="18" charset="0"/>
+              <a:buChar char="−"/>
+            </a:pPr>
+            <a:r>
+              <a:rPr lang="en-GB" sz="2800" dirty="0" smtClean="0">
+                <a:latin typeface="Garamond" pitchFamily="18" charset="0"/>
+              </a:rPr>
+              <a:t>Encrypted </a:t>
+            </a:r>
+            <a:r>
+              <a:rPr lang="en-GB" sz="2800" dirty="0" smtClean="0">
+                <a:latin typeface="Garamond" pitchFamily="18" charset="0"/>
+              </a:rPr>
+              <a:t>Media Extensions (EME) will provide a common API to interact with DRM </a:t>
+            </a:r>
+            <a:r>
+              <a:rPr lang="en-GB" sz="2800" dirty="0" smtClean="0">
+                <a:latin typeface="Garamond" pitchFamily="18" charset="0"/>
+              </a:rPr>
+              <a:t>systems</a:t>
+            </a:r>
+            <a:endParaRPr lang="en-GB" sz="2800" dirty="0">
               <a:latin typeface="Garamond" pitchFamily="18" charset="0"/>
             </a:endParaRPr>
           </a:p>
@@ -4188,12 +4768,24 @@
               <a:buChar char="−"/>
             </a:pPr>
             <a:r>
-              <a:rPr lang="en-GB" dirty="0" smtClean="0">
-                <a:latin typeface="Garamond" pitchFamily="18" charset="0"/>
-              </a:rPr>
-              <a:t>Hello</a:t>
-            </a:r>
-            <a:endParaRPr lang="en-GB" dirty="0">
+              <a:rPr lang="en-GB" sz="2800" dirty="0" smtClean="0">
+                <a:latin typeface="Garamond" pitchFamily="18" charset="0"/>
+              </a:rPr>
+              <a:t>Conflicting research into performance differences between Flash and HTML5 video</a:t>
+            </a:r>
+          </a:p>
+          <a:p>
+            <a:pPr>
+              <a:buFont typeface="Garamond" pitchFamily="18" charset="0"/>
+              <a:buChar char="−"/>
+            </a:pPr>
+            <a:r>
+              <a:rPr lang="en-GB" sz="2800" dirty="0" smtClean="0">
+                <a:latin typeface="Garamond" pitchFamily="18" charset="0"/>
+              </a:rPr>
+              <a:t>Varies between browsers</a:t>
+            </a:r>
+            <a:endParaRPr lang="en-GB" sz="2800" dirty="0">
               <a:latin typeface="Garamond" pitchFamily="18" charset="0"/>
             </a:endParaRPr>
           </a:p>
@@ -4367,7 +4959,7 @@
         </p:spPr>
         <p:txBody>
           <a:bodyPr>
-            <a:normAutofit/>
+            <a:noAutofit/>
           </a:bodyPr>
           <a:lstStyle/>
           <a:p>
@@ -4376,12 +4968,99 @@
               <a:buChar char="−"/>
             </a:pPr>
             <a:r>
-              <a:rPr lang="en-GB" dirty="0" smtClean="0">
-                <a:latin typeface="Garamond" pitchFamily="18" charset="0"/>
-              </a:rPr>
-              <a:t>Hello</a:t>
-            </a:r>
-            <a:endParaRPr lang="en-GB" dirty="0">
+              <a:rPr lang="en-GB" sz="2800" dirty="0" smtClean="0">
+                <a:latin typeface="Garamond" pitchFamily="18" charset="0"/>
+              </a:rPr>
+              <a:t>HTML5 </a:t>
+            </a:r>
+            <a:r>
+              <a:rPr lang="en-GB" sz="2800" dirty="0" smtClean="0">
+                <a:latin typeface="Garamond" pitchFamily="18" charset="0"/>
+              </a:rPr>
+              <a:t>video support the &lt;</a:t>
+            </a:r>
+            <a:r>
+              <a:rPr lang="en-GB" sz="2800" dirty="0" smtClean="0">
+                <a:latin typeface="Garamond" pitchFamily="18" charset="0"/>
+              </a:rPr>
+              <a:t>track&gt; tag to specify subtitle </a:t>
+            </a:r>
+            <a:r>
+              <a:rPr lang="en-GB" sz="2800" dirty="0" smtClean="0">
+                <a:latin typeface="Garamond" pitchFamily="18" charset="0"/>
+              </a:rPr>
+              <a:t>tracks</a:t>
+            </a:r>
+            <a:endParaRPr lang="en-GB" sz="2800" dirty="0" smtClean="0">
+              <a:latin typeface="Garamond" pitchFamily="18" charset="0"/>
+            </a:endParaRPr>
+          </a:p>
+          <a:p>
+            <a:pPr>
+              <a:buFont typeface="Garamond" pitchFamily="18" charset="0"/>
+              <a:buChar char="−"/>
+            </a:pPr>
+            <a:r>
+              <a:rPr lang="en-GB" sz="2800" dirty="0" smtClean="0">
+                <a:latin typeface="Garamond" pitchFamily="18" charset="0"/>
+              </a:rPr>
+              <a:t>Controls for plug-in based approaches are generally inaccessible to screen </a:t>
+            </a:r>
+            <a:r>
+              <a:rPr lang="en-GB" sz="2800" dirty="0" smtClean="0">
+                <a:latin typeface="Garamond" pitchFamily="18" charset="0"/>
+              </a:rPr>
+              <a:t>readers or confuse them</a:t>
+            </a:r>
+          </a:p>
+          <a:p>
+            <a:pPr>
+              <a:buFont typeface="Garamond" pitchFamily="18" charset="0"/>
+              <a:buChar char="−"/>
+            </a:pPr>
+            <a:r>
+              <a:rPr lang="en-GB" sz="2800" dirty="0" smtClean="0">
+                <a:latin typeface="Garamond" pitchFamily="18" charset="0"/>
+              </a:rPr>
+              <a:t>HTML5 </a:t>
+            </a:r>
+            <a:r>
+              <a:rPr lang="en-GB" sz="2800" dirty="0" smtClean="0">
+                <a:latin typeface="Garamond" pitchFamily="18" charset="0"/>
+              </a:rPr>
+              <a:t>video </a:t>
+            </a:r>
+            <a:r>
+              <a:rPr lang="en-GB" sz="2800" dirty="0" smtClean="0">
+                <a:latin typeface="Garamond" pitchFamily="18" charset="0"/>
+              </a:rPr>
+              <a:t>controls can be made </a:t>
+            </a:r>
+            <a:r>
+              <a:rPr lang="en-GB" sz="2800" dirty="0" smtClean="0">
+                <a:latin typeface="Garamond" pitchFamily="18" charset="0"/>
+              </a:rPr>
+              <a:t>accessible by adding HTML buttons to </a:t>
+            </a:r>
+            <a:r>
+              <a:rPr lang="en-GB" sz="2800" dirty="0" smtClean="0">
+                <a:latin typeface="Garamond" pitchFamily="18" charset="0"/>
+              </a:rPr>
+              <a:t>control </a:t>
+            </a:r>
+            <a:r>
+              <a:rPr lang="en-GB" sz="2800" dirty="0" smtClean="0">
+                <a:latin typeface="Garamond" pitchFamily="18" charset="0"/>
+              </a:rPr>
+              <a:t>the </a:t>
+            </a:r>
+            <a:r>
+              <a:rPr lang="en-GB" sz="2800" dirty="0" smtClean="0">
+                <a:latin typeface="Garamond" pitchFamily="18" charset="0"/>
+              </a:rPr>
+              <a:t>player</a:t>
+            </a:r>
+            <a:endParaRPr lang="en-GB" sz="2800" dirty="0">
               <a:latin typeface="Garamond" pitchFamily="18" charset="0"/>
             </a:endParaRPr>
           </a:p>
@@ -4555,7 +5234,7 @@
         </p:spPr>
         <p:txBody>
           <a:bodyPr>
-            <a:normAutofit/>
+            <a:noAutofit/>
           </a:bodyPr>
           <a:lstStyle/>
           <a:p>
@@ -4564,12 +5243,102 @@
               <a:buChar char="−"/>
             </a:pPr>
             <a:r>
-              <a:rPr lang="en-GB" dirty="0" smtClean="0">
-                <a:latin typeface="Garamond" pitchFamily="18" charset="0"/>
-              </a:rPr>
-              <a:t>Hello</a:t>
-            </a:r>
-            <a:endParaRPr lang="en-GB" dirty="0">
+              <a:rPr lang="en-GB" sz="2800" dirty="0" smtClean="0">
+                <a:latin typeface="Garamond" pitchFamily="18" charset="0"/>
+              </a:rPr>
+              <a:t>HTML5 video is a viable replacement for plug-in based approaches, albeit with some work still to </a:t>
+            </a:r>
+            <a:r>
+              <a:rPr lang="en-GB" sz="2800" dirty="0" smtClean="0">
+                <a:latin typeface="Garamond" pitchFamily="18" charset="0"/>
+              </a:rPr>
+              <a:t>do</a:t>
+            </a:r>
+          </a:p>
+          <a:p>
+            <a:pPr>
+              <a:buFont typeface="Garamond" pitchFamily="18" charset="0"/>
+              <a:buChar char="−"/>
+            </a:pPr>
+            <a:r>
+              <a:rPr lang="en-GB" sz="2800" dirty="0" smtClean="0">
+                <a:latin typeface="Garamond" pitchFamily="18" charset="0"/>
+              </a:rPr>
+              <a:t>Plug-in based approaches are </a:t>
+            </a:r>
+            <a:r>
+              <a:rPr lang="en-GB" sz="2800" dirty="0" smtClean="0">
+                <a:latin typeface="Garamond" pitchFamily="18" charset="0"/>
+              </a:rPr>
+              <a:t>more mature </a:t>
+            </a:r>
+            <a:r>
+              <a:rPr lang="en-GB" sz="2800" dirty="0" smtClean="0">
+                <a:latin typeface="Garamond" pitchFamily="18" charset="0"/>
+              </a:rPr>
+              <a:t>and offer a better experience on desktop </a:t>
+            </a:r>
+            <a:r>
+              <a:rPr lang="en-GB" sz="2800" dirty="0" smtClean="0">
+                <a:latin typeface="Garamond" pitchFamily="18" charset="0"/>
+              </a:rPr>
+              <a:t>web </a:t>
+            </a:r>
+            <a:r>
+              <a:rPr lang="en-GB" sz="2800" dirty="0" smtClean="0">
+                <a:latin typeface="Garamond" pitchFamily="18" charset="0"/>
+              </a:rPr>
+              <a:t>browsers</a:t>
+            </a:r>
+          </a:p>
+          <a:p>
+            <a:pPr>
+              <a:buFont typeface="Garamond" pitchFamily="18" charset="0"/>
+              <a:buChar char="−"/>
+            </a:pPr>
+            <a:r>
+              <a:rPr lang="en-GB" sz="2800" dirty="0" smtClean="0">
+                <a:latin typeface="Garamond" pitchFamily="18" charset="0"/>
+              </a:rPr>
+              <a:t>HTML5 </a:t>
+            </a:r>
+            <a:r>
+              <a:rPr lang="en-GB" sz="2800" dirty="0" smtClean="0">
+                <a:latin typeface="Garamond" pitchFamily="18" charset="0"/>
+              </a:rPr>
+              <a:t>standardisation efforts </a:t>
+            </a:r>
+            <a:r>
+              <a:rPr lang="en-GB" sz="2800" dirty="0" smtClean="0">
+                <a:latin typeface="Garamond" pitchFamily="18" charset="0"/>
+              </a:rPr>
+              <a:t>must continue</a:t>
+            </a:r>
+          </a:p>
+          <a:p>
+            <a:pPr>
+              <a:buFont typeface="Garamond" pitchFamily="18" charset="0"/>
+              <a:buChar char="−"/>
+            </a:pPr>
+            <a:r>
+              <a:rPr lang="en-GB" sz="2800" dirty="0" smtClean="0">
+                <a:latin typeface="Garamond" pitchFamily="18" charset="0"/>
+              </a:rPr>
+              <a:t>The use </a:t>
+            </a:r>
+            <a:r>
+              <a:rPr lang="en-GB" sz="2800" dirty="0" smtClean="0">
+                <a:latin typeface="Garamond" pitchFamily="18" charset="0"/>
+              </a:rPr>
+              <a:t>of HTML5 video by content providers, such as </a:t>
+            </a:r>
+            <a:r>
+              <a:rPr lang="en-GB" sz="2800" dirty="0" smtClean="0">
+                <a:latin typeface="Garamond" pitchFamily="18" charset="0"/>
+              </a:rPr>
+              <a:t>YouTube, should drive adoption</a:t>
+            </a:r>
+            <a:endParaRPr lang="en-GB" sz="2800" dirty="0">
               <a:latin typeface="Garamond" pitchFamily="18" charset="0"/>
             </a:endParaRPr>
           </a:p>
@@ -4864,4 +5633,287 @@
   <a:objectDefaults/>
   <a:extraClrSchemeLst/>
 </a:theme>
+</file>
+
+<file path=ppt/theme/theme2.xml><?xml version="1.0" encoding="utf-8"?>
+<a:theme xmlns:a="http://schemas.openxmlformats.org/drawingml/2006/main" name="Office Theme">
+  <a:themeElements>
+    <a:clrScheme name="Office">
+      <a:dk1>
+        <a:sysClr val="windowText" lastClr="000000"/>
+      </a:dk1>
+      <a:lt1>
+        <a:sysClr val="window" lastClr="FFFFFF"/>
+      </a:lt1>
+      <a:dk2>
+        <a:srgbClr val="1F497D"/>
+      </a:dk2>
+      <a:lt2>
+        <a:srgbClr val="EEECE1"/>
+      </a:lt2>
+      <a:accent1>
+        <a:srgbClr val="4F81BD"/>
+      </a:accent1>
+      <a:accent2>
+        <a:srgbClr val="C0504D"/>
+      </a:accent2>
+      <a:accent3>
+        <a:srgbClr val="9BBB59"/>
+      </a:accent3>
+      <a:accent4>
+        <a:srgbClr val="8064A2"/>
+      </a:accent4>
+      <a:accent5>
+        <a:srgbClr val="4BACC6"/>
+      </a:accent5>
+      <a:accent6>
+        <a:srgbClr val="F79646"/>
+      </a:accent6>
+      <a:hlink>
+        <a:srgbClr val="0000FF"/>
+      </a:hlink>
+      <a:folHlink>
+        <a:srgbClr val="800080"/>
+      </a:folHlink>
+    </a:clrScheme>
+    <a:fontScheme name="Office">
+      <a:majorFont>
+        <a:latin typeface="Calibri"/>
+        <a:ea typeface=""/>
+        <a:cs typeface=""/>
+        <a:font script="Jpan" typeface="ＭＳ Ｐゴシック"/>
+        <a:font script="Hang" typeface="맑은 고딕"/>
+        <a:font script="Hans" typeface="宋体"/>
+        <a:font script="Hant" typeface="新細明體"/>
+        <a:font script="Arab" typeface="Times New Roman"/>
+        <a:font script="Hebr" typeface="Times New Roman"/>
+        <a:font script="Thai" typeface="Angsana New"/>
+        <a:font script="Ethi" typeface="Nyala"/>
+        <a:font script="Beng" typeface="Vrinda"/>
+        <a:font script="Gujr" typeface="Shruti"/>
+        <a:font script="Khmr" typeface="MoolBoran"/>
+        <a:font script="Knda" typeface="Tunga"/>
+        <a:font script="Guru" typeface="Raavi"/>
+        <a:font script="Cans" typeface="Euphemia"/>
+        <a:font script="Cher" typeface="Plantagenet Cherokee"/>
+        <a:font script="Yiii" typeface="Microsoft Yi Baiti"/>
+        <a:font script="Tibt" typeface="Microsoft Himalaya"/>
+        <a:font script="Thaa" typeface="MV Boli"/>
+        <a:font script="Deva" typeface="Mangal"/>
+        <a:font script="Telu" typeface="Gautami"/>
+        <a:font script="Taml" typeface="Latha"/>
+        <a:font script="Syrc" typeface="Estrangelo Edessa"/>
+        <a:font script="Orya" typeface="Kalinga"/>
+        <a:font script="Mlym" typeface="Kartika"/>
+        <a:font script="Laoo" typeface="DokChampa"/>
+        <a:font script="Sinh" typeface="Iskoola Pota"/>
+        <a:font script="Mong" typeface="Mongolian Baiti"/>
+        <a:font script="Viet" typeface="Times New Roman"/>
+        <a:font script="Uigh" typeface="Microsoft Uighur"/>
+      </a:majorFont>
+      <a:minorFont>
+        <a:latin typeface="Calibri"/>
+        <a:ea typeface=""/>
+        <a:cs typeface=""/>
+        <a:font script="Jpan" typeface="ＭＳ Ｐゴシック"/>
+        <a:font script="Hang" typeface="맑은 고딕"/>
+        <a:font script="Hans" typeface="宋体"/>
+        <a:font script="Hant" typeface="新細明體"/>
+        <a:font script="Arab" typeface="Arial"/>
+        <a:font script="Hebr" typeface="Arial"/>
+        <a:font script="Thai" typeface="Cordia New"/>
+        <a:font script="Ethi" typeface="Nyala"/>
+        <a:font script="Beng" typeface="Vrinda"/>
+        <a:font script="Gujr" typeface="Shruti"/>
+        <a:font script="Khmr" typeface="DaunPenh"/>
+        <a:font script="Knda" typeface="Tunga"/>
+        <a:font script="Guru" typeface="Raavi"/>
+        <a:font script="Cans" typeface="Euphemia"/>
+        <a:font script="Cher" typeface="Plantagenet Cherokee"/>
+        <a:font script="Yiii" typeface="Microsoft Yi Baiti"/>
+        <a:font script="Tibt" typeface="Microsoft Himalaya"/>
+        <a:font script="Thaa" typeface="MV Boli"/>
+        <a:font script="Deva" typeface="Mangal"/>
+        <a:font script="Telu" typeface="Gautami"/>
+        <a:font script="Taml" typeface="Latha"/>
+        <a:font script="Syrc" typeface="Estrangelo Edessa"/>
+        <a:font script="Orya" typeface="Kalinga"/>
+        <a:font script="Mlym" typeface="Kartika"/>
+        <a:font script="Laoo" typeface="DokChampa"/>
+        <a:font script="Sinh" typeface="Iskoola Pota"/>
+        <a:font script="Mong" typeface="Mongolian Baiti"/>
+        <a:font script="Viet" typeface="Arial"/>
+        <a:font script="Uigh" typeface="Microsoft Uighur"/>
+      </a:minorFont>
+    </a:fontScheme>
+    <a:fmtScheme name="Office">
+      <a:fillStyleLst>
+        <a:solidFill>
+          <a:schemeClr val="phClr"/>
+        </a:solidFill>
+        <a:gradFill rotWithShape="1">
+          <a:gsLst>
+            <a:gs pos="0">
+              <a:schemeClr val="phClr">
+                <a:tint val="50000"/>
+                <a:satMod val="300000"/>
+              </a:schemeClr>
+            </a:gs>
+            <a:gs pos="35000">
+              <a:schemeClr val="phClr">
+                <a:tint val="37000"/>
+                <a:satMod val="300000"/>
+              </a:schemeClr>
+            </a:gs>
+            <a:gs pos="100000">
+              <a:schemeClr val="phClr">
+                <a:tint val="15000"/>
+                <a:satMod val="350000"/>
+              </a:schemeClr>
+            </a:gs>
+          </a:gsLst>
+          <a:lin ang="16200000" scaled="1"/>
+        </a:gradFill>
+        <a:gradFill rotWithShape="1">
+          <a:gsLst>
+            <a:gs pos="0">
+              <a:schemeClr val="phClr">
+                <a:shade val="51000"/>
+                <a:satMod val="130000"/>
+              </a:schemeClr>
+            </a:gs>
+            <a:gs pos="80000">
+              <a:schemeClr val="phClr">
+                <a:shade val="93000"/>
+                <a:satMod val="130000"/>
+              </a:schemeClr>
+            </a:gs>
+            <a:gs pos="100000">
+              <a:schemeClr val="phClr">
+                <a:shade val="94000"/>
+                <a:satMod val="135000"/>
+              </a:schemeClr>
+            </a:gs>
+          </a:gsLst>
+          <a:lin ang="16200000" scaled="0"/>
+        </a:gradFill>
+      </a:fillStyleLst>
+      <a:lnStyleLst>
+        <a:ln w="9525" cap="flat" cmpd="sng" algn="ctr">
+          <a:solidFill>
+            <a:schemeClr val="phClr">
+              <a:shade val="95000"/>
+              <a:satMod val="105000"/>
+            </a:schemeClr>
+          </a:solidFill>
+          <a:prstDash val="solid"/>
+        </a:ln>
+        <a:ln w="25400" cap="flat" cmpd="sng" algn="ctr">
+          <a:solidFill>
+            <a:schemeClr val="phClr"/>
+          </a:solidFill>
+          <a:prstDash val="solid"/>
+        </a:ln>
+        <a:ln w="38100" cap="flat" cmpd="sng" algn="ctr">
+          <a:solidFill>
+            <a:schemeClr val="phClr"/>
+          </a:solidFill>
+          <a:prstDash val="solid"/>
+        </a:ln>
+      </a:lnStyleLst>
+      <a:effectStyleLst>
+        <a:effectStyle>
+          <a:effectLst>
+            <a:outerShdw blurRad="40000" dist="20000" dir="5400000" rotWithShape="0">
+              <a:srgbClr val="000000">
+                <a:alpha val="38000"/>
+              </a:srgbClr>
+            </a:outerShdw>
+          </a:effectLst>
+        </a:effectStyle>
+        <a:effectStyle>
+          <a:effectLst>
+            <a:outerShdw blurRad="40000" dist="23000" dir="5400000" rotWithShape="0">
+              <a:srgbClr val="000000">
+                <a:alpha val="35000"/>
+              </a:srgbClr>
+            </a:outerShdw>
+          </a:effectLst>
+        </a:effectStyle>
+        <a:effectStyle>
+          <a:effectLst>
+            <a:outerShdw blurRad="40000" dist="23000" dir="5400000" rotWithShape="0">
+              <a:srgbClr val="000000">
+                <a:alpha val="35000"/>
+              </a:srgbClr>
+            </a:outerShdw>
+          </a:effectLst>
+          <a:scene3d>
+            <a:camera prst="orthographicFront">
+              <a:rot lat="0" lon="0" rev="0"/>
+            </a:camera>
+            <a:lightRig rig="threePt" dir="t">
+              <a:rot lat="0" lon="0" rev="1200000"/>
+            </a:lightRig>
+          </a:scene3d>
+          <a:sp3d>
+            <a:bevelT w="63500" h="25400"/>
+          </a:sp3d>
+        </a:effectStyle>
+      </a:effectStyleLst>
+      <a:bgFillStyleLst>
+        <a:solidFill>
+          <a:schemeClr val="phClr"/>
+        </a:solidFill>
+        <a:gradFill rotWithShape="1">
+          <a:gsLst>
+            <a:gs pos="0">
+              <a:schemeClr val="phClr">
+                <a:tint val="40000"/>
+                <a:satMod val="350000"/>
+              </a:schemeClr>
+            </a:gs>
+            <a:gs pos="40000">
+              <a:schemeClr val="phClr">
+                <a:tint val="45000"/>
+                <a:shade val="99000"/>
+                <a:satMod val="350000"/>
+              </a:schemeClr>
+            </a:gs>
+            <a:gs pos="100000">
+              <a:schemeClr val="phClr">
+                <a:shade val="20000"/>
+                <a:satMod val="255000"/>
+              </a:schemeClr>
+            </a:gs>
+          </a:gsLst>
+          <a:path path="circle">
+            <a:fillToRect l="50000" t="-80000" r="50000" b="180000"/>
+          </a:path>
+        </a:gradFill>
+        <a:gradFill rotWithShape="1">
+          <a:gsLst>
+            <a:gs pos="0">
+              <a:schemeClr val="phClr">
+                <a:tint val="80000"/>
+                <a:satMod val="300000"/>
+              </a:schemeClr>
+            </a:gs>
+            <a:gs pos="100000">
+              <a:schemeClr val="phClr">
+                <a:shade val="30000"/>
+                <a:satMod val="200000"/>
+              </a:schemeClr>
+            </a:gs>
+          </a:gsLst>
+          <a:path path="circle">
+            <a:fillToRect l="50000" t="50000" r="50000" b="50000"/>
+          </a:path>
+        </a:gradFill>
+      </a:bgFillStyleLst>
+    </a:fmtScheme>
+  </a:themeElements>
+  <a:objectDefaults/>
+  <a:extraClrSchemeLst/>
+</a:theme>
 </file>
</xml_diff>

<commit_message>
Adjustments to slides and poster
</commit_message>
<xml_diff>
--- a/presentation/slides.pptx
+++ b/presentation/slides.pptx
@@ -199,7 +199,8 @@
           <a:p>
             <a:fld id="{8F9A1DBC-8C61-41BD-94B9-870336526AAD}" type="datetimeFigureOut">
               <a:rPr lang="en-GB" smtClean="0"/>
-              <a:t>06/05/2014</a:t>
+              <a:pPr/>
+              <a:t>08/05/2014</a:t>
             </a:fld>
             <a:endParaRPr lang="en-GB"/>
           </a:p>
@@ -265,6 +266,7 @@
           <a:p>
             <a:fld id="{1362DCA0-93F1-48C7-A7DC-CBB499102833}" type="slidenum">
               <a:rPr lang="en-GB" smtClean="0"/>
+              <a:pPr/>
               <a:t>‹#›</a:t>
             </a:fld>
             <a:endParaRPr lang="en-GB"/>
@@ -459,7 +461,7 @@
             <a:fld id="{B27620D7-7890-418F-9270-4BAB042765A0}" type="datetimeFigureOut">
               <a:rPr lang="en-GB" smtClean="0"/>
               <a:pPr/>
-              <a:t>06/05/2014</a:t>
+              <a:t>08/05/2014</a:t>
             </a:fld>
             <a:endParaRPr lang="en-GB"/>
           </a:p>
@@ -626,7 +628,7 @@
             <a:fld id="{B27620D7-7890-418F-9270-4BAB042765A0}" type="datetimeFigureOut">
               <a:rPr lang="en-GB" smtClean="0"/>
               <a:pPr/>
-              <a:t>06/05/2014</a:t>
+              <a:t>08/05/2014</a:t>
             </a:fld>
             <a:endParaRPr lang="en-GB"/>
           </a:p>
@@ -803,7 +805,7 @@
             <a:fld id="{B27620D7-7890-418F-9270-4BAB042765A0}" type="datetimeFigureOut">
               <a:rPr lang="en-GB" smtClean="0"/>
               <a:pPr/>
-              <a:t>06/05/2014</a:t>
+              <a:t>08/05/2014</a:t>
             </a:fld>
             <a:endParaRPr lang="en-GB"/>
           </a:p>
@@ -970,7 +972,7 @@
             <a:fld id="{B27620D7-7890-418F-9270-4BAB042765A0}" type="datetimeFigureOut">
               <a:rPr lang="en-GB" smtClean="0"/>
               <a:pPr/>
-              <a:t>06/05/2014</a:t>
+              <a:t>08/05/2014</a:t>
             </a:fld>
             <a:endParaRPr lang="en-GB"/>
           </a:p>
@@ -1213,7 +1215,7 @@
             <a:fld id="{B27620D7-7890-418F-9270-4BAB042765A0}" type="datetimeFigureOut">
               <a:rPr lang="en-GB" smtClean="0"/>
               <a:pPr/>
-              <a:t>06/05/2014</a:t>
+              <a:t>08/05/2014</a:t>
             </a:fld>
             <a:endParaRPr lang="en-GB"/>
           </a:p>
@@ -1498,7 +1500,7 @@
             <a:fld id="{B27620D7-7890-418F-9270-4BAB042765A0}" type="datetimeFigureOut">
               <a:rPr lang="en-GB" smtClean="0"/>
               <a:pPr/>
-              <a:t>06/05/2014</a:t>
+              <a:t>08/05/2014</a:t>
             </a:fld>
             <a:endParaRPr lang="en-GB"/>
           </a:p>
@@ -1917,7 +1919,7 @@
             <a:fld id="{B27620D7-7890-418F-9270-4BAB042765A0}" type="datetimeFigureOut">
               <a:rPr lang="en-GB" smtClean="0"/>
               <a:pPr/>
-              <a:t>06/05/2014</a:t>
+              <a:t>08/05/2014</a:t>
             </a:fld>
             <a:endParaRPr lang="en-GB"/>
           </a:p>
@@ -2032,7 +2034,7 @@
             <a:fld id="{B27620D7-7890-418F-9270-4BAB042765A0}" type="datetimeFigureOut">
               <a:rPr lang="en-GB" smtClean="0"/>
               <a:pPr/>
-              <a:t>06/05/2014</a:t>
+              <a:t>08/05/2014</a:t>
             </a:fld>
             <a:endParaRPr lang="en-GB"/>
           </a:p>
@@ -2124,7 +2126,7 @@
             <a:fld id="{B27620D7-7890-418F-9270-4BAB042765A0}" type="datetimeFigureOut">
               <a:rPr lang="en-GB" smtClean="0"/>
               <a:pPr/>
-              <a:t>06/05/2014</a:t>
+              <a:t>08/05/2014</a:t>
             </a:fld>
             <a:endParaRPr lang="en-GB"/>
           </a:p>
@@ -2398,7 +2400,7 @@
             <a:fld id="{B27620D7-7890-418F-9270-4BAB042765A0}" type="datetimeFigureOut">
               <a:rPr lang="en-GB" smtClean="0"/>
               <a:pPr/>
-              <a:t>06/05/2014</a:t>
+              <a:t>08/05/2014</a:t>
             </a:fld>
             <a:endParaRPr lang="en-GB"/>
           </a:p>
@@ -2648,7 +2650,7 @@
             <a:fld id="{B27620D7-7890-418F-9270-4BAB042765A0}" type="datetimeFigureOut">
               <a:rPr lang="en-GB" smtClean="0"/>
               <a:pPr/>
-              <a:t>06/05/2014</a:t>
+              <a:t>08/05/2014</a:t>
             </a:fld>
             <a:endParaRPr lang="en-GB"/>
           </a:p>
@@ -2858,7 +2860,7 @@
             <a:fld id="{B27620D7-7890-418F-9270-4BAB042765A0}" type="datetimeFigureOut">
               <a:rPr lang="en-GB" smtClean="0"/>
               <a:pPr/>
-              <a:t>06/05/2014</a:t>
+              <a:t>08/05/2014</a:t>
             </a:fld>
             <a:endParaRPr lang="en-GB"/>
           </a:p>
@@ -3238,7 +3240,7 @@
         <p:spPr>
           <a:xfrm>
             <a:off x="0" y="4653136"/>
-            <a:ext cx="2699792" cy="1008112"/>
+            <a:ext cx="3059832" cy="936104"/>
           </a:xfrm>
           <a:prstGeom prst="rect">
             <a:avLst/>
@@ -3390,23 +3392,30 @@
         </p:nvSpPr>
         <p:spPr>
           <a:xfrm>
-            <a:off x="323528" y="4725144"/>
-            <a:ext cx="2232248" cy="864096"/>
+            <a:off x="395536" y="4725144"/>
+            <a:ext cx="2664296" cy="720080"/>
           </a:xfrm>
         </p:spPr>
         <p:txBody>
           <a:bodyPr>
-            <a:normAutofit/>
+            <a:noAutofit/>
           </a:bodyPr>
           <a:lstStyle/>
           <a:p>
-            <a:pPr algn="l"/>
+            <a:pPr algn="l">
+              <a:spcBef>
+                <a:spcPts val="0"/>
+              </a:spcBef>
+              <a:spcAft>
+                <a:spcPts val="400"/>
+              </a:spcAft>
+            </a:pPr>
             <a:r>
               <a:rPr lang="en-GB" sz="2000" dirty="0" smtClean="0">
                 <a:solidFill>
                   <a:srgbClr val="231F20"/>
                 </a:solidFill>
-                <a:latin typeface="Quicksand" pitchFamily="18" charset="0"/>
+                <a:latin typeface="Helvetica" pitchFamily="34" charset="0"/>
               </a:rPr>
               <a:t>David </a:t>
             </a:r>
@@ -3415,7 +3424,7 @@
                 <a:solidFill>
                   <a:srgbClr val="231F20"/>
                 </a:solidFill>
-                <a:latin typeface="Quicksand" pitchFamily="18" charset="0"/>
+                <a:latin typeface="Helvetica" pitchFamily="34" charset="0"/>
               </a:rPr>
               <a:t>Hulme</a:t>
             </a:r>
@@ -3423,25 +3432,41 @@
               <a:solidFill>
                 <a:srgbClr val="231F20"/>
               </a:solidFill>
-              <a:latin typeface="Quicksand" pitchFamily="18" charset="0"/>
+              <a:latin typeface="Helvetica" pitchFamily="34" charset="0"/>
             </a:endParaRPr>
           </a:p>
           <a:p>
-            <a:pPr algn="l"/>
-            <a:r>
-              <a:rPr lang="en-GB" sz="2000" dirty="0" smtClean="0">
+            <a:pPr algn="l">
+              <a:spcBef>
+                <a:spcPts val="0"/>
+              </a:spcBef>
+              <a:spcAft>
+                <a:spcPts val="400"/>
+              </a:spcAft>
+            </a:pPr>
+            <a:r>
+              <a:rPr lang="en-GB" sz="1600" dirty="0" smtClean="0">
                 <a:solidFill>
                   <a:srgbClr val="231F20"/>
                 </a:solidFill>
-                <a:latin typeface="Quicksand" pitchFamily="18" charset="0"/>
+                <a:latin typeface="Helvetica" pitchFamily="34" charset="0"/>
               </a:rPr>
-              <a:t>Kirk Martinez</a:t>
-            </a:r>
-            <a:endParaRPr lang="en-GB" sz="2000" dirty="0">
+              <a:t>Kirk </a:t>
+            </a:r>
+            <a:r>
+              <a:rPr lang="en-GB" sz="1600" dirty="0" smtClean="0">
+                <a:solidFill>
+                  <a:srgbClr val="231F20"/>
+                </a:solidFill>
+                <a:latin typeface="Helvetica" pitchFamily="34" charset="0"/>
+              </a:rPr>
+              <a:t>Martinez (Supervisor)</a:t>
+            </a:r>
+            <a:endParaRPr lang="en-GB" sz="1600" dirty="0" smtClean="0">
               <a:solidFill>
                 <a:srgbClr val="231F20"/>
               </a:solidFill>
-              <a:latin typeface="Quicksand" pitchFamily="18" charset="0"/>
+              <a:latin typeface="Helvetica" pitchFamily="34" charset="0"/>
             </a:endParaRPr>
           </a:p>
         </p:txBody>
@@ -3586,12 +3611,12 @@
             <a:pPr algn="l"/>
             <a:r>
               <a:rPr lang="en-GB" dirty="0" smtClean="0">
-                <a:latin typeface="Quicksand" pitchFamily="18" charset="0"/>
+                <a:latin typeface="Helvetica" pitchFamily="34" charset="0"/>
               </a:rPr>
               <a:t>Introduction</a:t>
             </a:r>
             <a:endParaRPr lang="en-GB" dirty="0">
-              <a:latin typeface="Quicksand" pitchFamily="18" charset="0"/>
+              <a:latin typeface="Helvetica" pitchFamily="34" charset="0"/>
             </a:endParaRPr>
           </a:p>
         </p:txBody>
@@ -3638,19 +3663,7 @@
               <a:rPr lang="en-GB" sz="2800" dirty="0" smtClean="0">
                 <a:latin typeface="Garamond" pitchFamily="18" charset="0"/>
               </a:rPr>
-              <a:t>Many devices </a:t>
-            </a:r>
-            <a:r>
-              <a:rPr lang="en-GB" sz="2800" dirty="0" smtClean="0">
-                <a:latin typeface="Garamond" pitchFamily="18" charset="0"/>
-              </a:rPr>
-              <a:t>and </a:t>
-            </a:r>
-            <a:r>
-              <a:rPr lang="en-GB" sz="2800" dirty="0" smtClean="0">
-                <a:latin typeface="Garamond" pitchFamily="18" charset="0"/>
-              </a:rPr>
-              <a:t>platforms should be supported</a:t>
+              <a:t>Many devices and platforms should be supported</a:t>
             </a:r>
           </a:p>
           <a:p>
@@ -3662,19 +3675,7 @@
               <a:rPr lang="en-GB" sz="2800" dirty="0" smtClean="0">
                 <a:latin typeface="Garamond" pitchFamily="18" charset="0"/>
               </a:rPr>
-              <a:t>Historically achieved using </a:t>
-            </a:r>
-            <a:r>
-              <a:rPr lang="en-GB" sz="2800" dirty="0" smtClean="0">
-                <a:latin typeface="Garamond" pitchFamily="18" charset="0"/>
-              </a:rPr>
-              <a:t>third party </a:t>
-            </a:r>
-            <a:r>
-              <a:rPr lang="en-GB" sz="2800" dirty="0" smtClean="0">
-                <a:latin typeface="Garamond" pitchFamily="18" charset="0"/>
-              </a:rPr>
-              <a:t>plug-ins</a:t>
+              <a:t>Historically achieved using third party plug-ins</a:t>
             </a:r>
           </a:p>
           <a:p>
@@ -3686,19 +3687,7 @@
               <a:rPr lang="en-GB" sz="2800" dirty="0" smtClean="0">
                 <a:latin typeface="Garamond" pitchFamily="18" charset="0"/>
               </a:rPr>
-              <a:t>HTML5 </a:t>
-            </a:r>
-            <a:r>
-              <a:rPr lang="en-GB" sz="2800" dirty="0" smtClean="0">
-                <a:latin typeface="Garamond" pitchFamily="18" charset="0"/>
-              </a:rPr>
-              <a:t>enables videos to be embedded directly </a:t>
-            </a:r>
-            <a:r>
-              <a:rPr lang="en-GB" sz="2800" dirty="0" smtClean="0">
-                <a:latin typeface="Garamond" pitchFamily="18" charset="0"/>
-              </a:rPr>
-              <a:t>into web pages</a:t>
+              <a:t>HTML5 enables videos to be embedded directly into web pages</a:t>
             </a:r>
           </a:p>
           <a:p>
@@ -3710,31 +3699,7 @@
               <a:rPr lang="en-GB" sz="2800" dirty="0" smtClean="0">
                 <a:latin typeface="Garamond" pitchFamily="18" charset="0"/>
               </a:rPr>
-              <a:t>However</a:t>
-            </a:r>
-            <a:r>
-              <a:rPr lang="en-GB" sz="2800" dirty="0" smtClean="0">
-                <a:latin typeface="Garamond" pitchFamily="18" charset="0"/>
-              </a:rPr>
-              <a:t>, </a:t>
-            </a:r>
-            <a:r>
-              <a:rPr lang="en-GB" sz="2800" dirty="0" smtClean="0">
-                <a:latin typeface="Garamond" pitchFamily="18" charset="0"/>
-              </a:rPr>
-              <a:t>to be adopted </a:t>
-            </a:r>
-            <a:r>
-              <a:rPr lang="en-GB" sz="2800" dirty="0" smtClean="0">
-                <a:latin typeface="Garamond" pitchFamily="18" charset="0"/>
-              </a:rPr>
-              <a:t>it must support the features already offered by </a:t>
-            </a:r>
-            <a:r>
-              <a:rPr lang="en-GB" sz="2800" dirty="0" smtClean="0">
-                <a:latin typeface="Garamond" pitchFamily="18" charset="0"/>
-              </a:rPr>
-              <a:t>traditional approaches </a:t>
+              <a:t>However, to be adopted it must support the features already offered by traditional approaches </a:t>
             </a:r>
             <a:endParaRPr lang="en-GB" sz="2800" dirty="0">
               <a:latin typeface="Garamond" pitchFamily="18" charset="0"/>
@@ -3882,12 +3847,12 @@
             <a:pPr algn="l"/>
             <a:r>
               <a:rPr lang="en-GB" dirty="0" smtClean="0">
-                <a:latin typeface="Quicksand" pitchFamily="18" charset="0"/>
+                <a:latin typeface="Helvetica" pitchFamily="34" charset="0"/>
               </a:rPr>
               <a:t>Embedding Video</a:t>
             </a:r>
             <a:endParaRPr lang="en-GB" dirty="0">
-              <a:latin typeface="Quicksand" pitchFamily="18" charset="0"/>
+              <a:latin typeface="Helvetica" pitchFamily="34" charset="0"/>
             </a:endParaRPr>
           </a:p>
         </p:txBody>
@@ -3936,9 +3901,6 @@
               </a:rPr>
               <a:t>HTML5 video solves these problems</a:t>
             </a:r>
-            <a:endParaRPr lang="en-GB" sz="2800" dirty="0" smtClean="0">
-              <a:latin typeface="Garamond" pitchFamily="18" charset="0"/>
-            </a:endParaRPr>
           </a:p>
           <a:p>
             <a:pPr>
@@ -3949,19 +3911,7 @@
               <a:rPr lang="en-GB" sz="2800" dirty="0" smtClean="0">
                 <a:latin typeface="Garamond" pitchFamily="18" charset="0"/>
               </a:rPr>
-              <a:t>HTML5 </a:t>
-            </a:r>
-            <a:r>
-              <a:rPr lang="en-GB" sz="2800" dirty="0" smtClean="0">
-                <a:latin typeface="Garamond" pitchFamily="18" charset="0"/>
-              </a:rPr>
-              <a:t>video does not specify which formats should be supported, leading to differences between </a:t>
-            </a:r>
-            <a:r>
-              <a:rPr lang="en-GB" sz="2800" dirty="0" smtClean="0">
-                <a:latin typeface="Garamond" pitchFamily="18" charset="0"/>
-              </a:rPr>
-              <a:t>implementations</a:t>
+              <a:t>HTML5 video does not specify which formats should be supported, leading to differences between implementations</a:t>
             </a:r>
           </a:p>
           <a:p>
@@ -3973,19 +3923,7 @@
               <a:rPr lang="en-GB" sz="2800" dirty="0" smtClean="0">
                 <a:latin typeface="Garamond" pitchFamily="18" charset="0"/>
               </a:rPr>
-              <a:t>Developers can define multiple ‘sources’ for </a:t>
-            </a:r>
-            <a:r>
-              <a:rPr lang="en-GB" sz="2800" dirty="0" smtClean="0">
-                <a:latin typeface="Garamond" pitchFamily="18" charset="0"/>
-              </a:rPr>
-              <a:t>each </a:t>
-            </a:r>
-            <a:r>
-              <a:rPr lang="en-GB" sz="2800" dirty="0" smtClean="0">
-                <a:latin typeface="Garamond" pitchFamily="18" charset="0"/>
-              </a:rPr>
-              <a:t>video</a:t>
+              <a:t>Developers can define multiple ‘sources’ for each video</a:t>
             </a:r>
             <a:endParaRPr lang="en-GB" dirty="0">
               <a:latin typeface="Garamond" pitchFamily="18" charset="0"/>
@@ -4133,12 +4071,12 @@
             <a:pPr algn="l"/>
             <a:r>
               <a:rPr lang="en-GB" dirty="0" smtClean="0">
-                <a:latin typeface="Quicksand" pitchFamily="18" charset="0"/>
+                <a:latin typeface="Helvetica" pitchFamily="34" charset="0"/>
               </a:rPr>
               <a:t>Streaming Video</a:t>
             </a:r>
             <a:endParaRPr lang="en-GB" dirty="0">
-              <a:latin typeface="Quicksand" pitchFamily="18" charset="0"/>
+              <a:latin typeface="Helvetica" pitchFamily="34" charset="0"/>
             </a:endParaRPr>
           </a:p>
         </p:txBody>
@@ -4185,19 +4123,7 @@
               <a:rPr lang="en-GB" sz="2800" dirty="0" smtClean="0">
                 <a:latin typeface="Garamond" pitchFamily="18" charset="0"/>
               </a:rPr>
-              <a:t>Plug-in </a:t>
-            </a:r>
-            <a:r>
-              <a:rPr lang="en-GB" sz="2800" dirty="0" smtClean="0">
-                <a:latin typeface="Garamond" pitchFamily="18" charset="0"/>
-              </a:rPr>
-              <a:t>based approaches use </a:t>
-            </a:r>
-            <a:r>
-              <a:rPr lang="en-GB" sz="2800" dirty="0" smtClean="0">
-                <a:latin typeface="Garamond" pitchFamily="18" charset="0"/>
-              </a:rPr>
-              <a:t>both</a:t>
+              <a:t>Plug-in based approaches use both</a:t>
             </a:r>
           </a:p>
           <a:p>
@@ -4209,19 +4135,7 @@
               <a:rPr lang="en-GB" sz="2800" dirty="0" smtClean="0">
                 <a:latin typeface="Garamond" pitchFamily="18" charset="0"/>
               </a:rPr>
-              <a:t>HTML5 </a:t>
-            </a:r>
-            <a:r>
-              <a:rPr lang="en-GB" sz="2800" dirty="0" smtClean="0">
-                <a:latin typeface="Garamond" pitchFamily="18" charset="0"/>
-              </a:rPr>
-              <a:t>video typically uses </a:t>
-            </a:r>
-            <a:r>
-              <a:rPr lang="en-GB" sz="2800" dirty="0" smtClean="0">
-                <a:latin typeface="Garamond" pitchFamily="18" charset="0"/>
-              </a:rPr>
-              <a:t>pull-based</a:t>
+              <a:t>HTML5 video typically uses pull-based</a:t>
             </a:r>
           </a:p>
           <a:p>
@@ -4233,23 +4147,8 @@
               <a:rPr lang="en-GB" sz="2800" dirty="0" smtClean="0">
                 <a:latin typeface="Garamond" pitchFamily="18" charset="0"/>
               </a:rPr>
-              <a:t>Both methods support </a:t>
-            </a:r>
-            <a:r>
-              <a:rPr lang="en-GB" sz="2800" dirty="0" smtClean="0">
-                <a:latin typeface="Garamond" pitchFamily="18" charset="0"/>
-              </a:rPr>
-              <a:t>adaptive </a:t>
-            </a:r>
-            <a:r>
-              <a:rPr lang="en-GB" sz="2800" dirty="0" smtClean="0">
-                <a:latin typeface="Garamond" pitchFamily="18" charset="0"/>
-              </a:rPr>
-              <a:t>streaming</a:t>
-            </a:r>
-            <a:endParaRPr lang="en-GB" sz="2800" dirty="0" smtClean="0">
-              <a:latin typeface="Garamond" pitchFamily="18" charset="0"/>
-            </a:endParaRPr>
+              <a:t>Both methods support adaptive streaming</a:t>
+            </a:r>
           </a:p>
           <a:p>
             <a:pPr>
@@ -4260,25 +4159,7 @@
               <a:rPr lang="en-GB" sz="2800" dirty="0" smtClean="0">
                 <a:latin typeface="Garamond" pitchFamily="18" charset="0"/>
               </a:rPr>
-              <a:t>O</a:t>
-            </a:r>
-            <a:r>
-              <a:rPr lang="en-GB" sz="2800" dirty="0" smtClean="0">
-                <a:latin typeface="Garamond" pitchFamily="18" charset="0"/>
-              </a:rPr>
-              <a:t>n-demand </a:t>
-            </a:r>
-            <a:r>
-              <a:rPr lang="en-GB" sz="2800" dirty="0" smtClean="0">
-                <a:latin typeface="Garamond" pitchFamily="18" charset="0"/>
-              </a:rPr>
-              <a:t>media and live </a:t>
-            </a:r>
-            <a:r>
-              <a:rPr lang="en-GB" sz="2800" dirty="0" smtClean="0">
-                <a:latin typeface="Garamond" pitchFamily="18" charset="0"/>
-              </a:rPr>
-              <a:t>media should be supported</a:t>
+              <a:t>On-demand media and live media should be supported</a:t>
             </a:r>
           </a:p>
           <a:p>
@@ -4435,12 +4316,12 @@
             <a:pPr algn="l"/>
             <a:r>
               <a:rPr lang="en-GB" dirty="0" smtClean="0">
-                <a:latin typeface="Quicksand" pitchFamily="18" charset="0"/>
+                <a:latin typeface="Helvetica" pitchFamily="34" charset="0"/>
               </a:rPr>
               <a:t>Content Protection</a:t>
             </a:r>
             <a:endParaRPr lang="en-GB" dirty="0">
-              <a:latin typeface="Quicksand" pitchFamily="18" charset="0"/>
+              <a:latin typeface="Helvetica" pitchFamily="34" charset="0"/>
             </a:endParaRPr>
           </a:p>
         </p:txBody>
@@ -4475,19 +4356,7 @@
               <a:rPr lang="en-GB" sz="2800" dirty="0" smtClean="0">
                 <a:latin typeface="Garamond" pitchFamily="18" charset="0"/>
               </a:rPr>
-              <a:t>Delivered video content can </a:t>
-            </a:r>
-            <a:r>
-              <a:rPr lang="en-GB" sz="2800" dirty="0" smtClean="0">
-                <a:latin typeface="Garamond" pitchFamily="18" charset="0"/>
-              </a:rPr>
-              <a:t>be </a:t>
-            </a:r>
-            <a:r>
-              <a:rPr lang="en-GB" sz="2800" dirty="0" smtClean="0">
-                <a:latin typeface="Garamond" pitchFamily="18" charset="0"/>
-              </a:rPr>
-              <a:t>captured</a:t>
+              <a:t>Delivered video content can be captured</a:t>
             </a:r>
           </a:p>
           <a:p>
@@ -4511,31 +4380,7 @@
               <a:rPr lang="en-GB" sz="2800" dirty="0" smtClean="0">
                 <a:latin typeface="Garamond" pitchFamily="18" charset="0"/>
               </a:rPr>
-              <a:t>If </a:t>
-            </a:r>
-            <a:r>
-              <a:rPr lang="en-GB" sz="2800" dirty="0" smtClean="0">
-                <a:latin typeface="Garamond" pitchFamily="18" charset="0"/>
-              </a:rPr>
-              <a:t>a user </a:t>
-            </a:r>
-            <a:r>
-              <a:rPr lang="en-GB" sz="2800" dirty="0" smtClean="0">
-                <a:latin typeface="Garamond" pitchFamily="18" charset="0"/>
-              </a:rPr>
-              <a:t>captures the video </a:t>
-            </a:r>
-            <a:r>
-              <a:rPr lang="en-GB" sz="2800" dirty="0" smtClean="0">
-                <a:latin typeface="Garamond" pitchFamily="18" charset="0"/>
-              </a:rPr>
-              <a:t>DRM technologies can be used to prevent </a:t>
-            </a:r>
-            <a:r>
-              <a:rPr lang="en-GB" sz="2800" dirty="0" smtClean="0">
-                <a:latin typeface="Garamond" pitchFamily="18" charset="0"/>
-              </a:rPr>
-              <a:t>playback</a:t>
+              <a:t>If a user captures the video DRM technologies can be used to prevent playback</a:t>
             </a:r>
           </a:p>
           <a:p>
@@ -4547,19 +4392,7 @@
               <a:rPr lang="en-GB" sz="2800" dirty="0" smtClean="0">
                 <a:latin typeface="Garamond" pitchFamily="18" charset="0"/>
               </a:rPr>
-              <a:t>HTML5 </a:t>
-            </a:r>
-            <a:r>
-              <a:rPr lang="en-GB" sz="2800" dirty="0" smtClean="0">
-                <a:latin typeface="Garamond" pitchFamily="18" charset="0"/>
-              </a:rPr>
-              <a:t>does not specify a DRM </a:t>
-            </a:r>
-            <a:r>
-              <a:rPr lang="en-GB" sz="2800" dirty="0" smtClean="0">
-                <a:latin typeface="Garamond" pitchFamily="18" charset="0"/>
-              </a:rPr>
-              <a:t>system</a:t>
+              <a:t>HTML5 does not specify a DRM system</a:t>
             </a:r>
           </a:p>
           <a:p>
@@ -4571,19 +4404,7 @@
               <a:rPr lang="en-GB" sz="2800" dirty="0" smtClean="0">
                 <a:latin typeface="Garamond" pitchFamily="18" charset="0"/>
               </a:rPr>
-              <a:t>Encrypted </a:t>
-            </a:r>
-            <a:r>
-              <a:rPr lang="en-GB" sz="2800" dirty="0" smtClean="0">
-                <a:latin typeface="Garamond" pitchFamily="18" charset="0"/>
-              </a:rPr>
-              <a:t>Media Extensions (EME) will provide a common API to interact with DRM </a:t>
-            </a:r>
-            <a:r>
-              <a:rPr lang="en-GB" sz="2800" dirty="0" smtClean="0">
-                <a:latin typeface="Garamond" pitchFamily="18" charset="0"/>
-              </a:rPr>
-              <a:t>systems</a:t>
+              <a:t>Encrypted Media Extensions (EME) will provide a common API to interact with DRM systems</a:t>
             </a:r>
             <a:endParaRPr lang="en-GB" sz="2800" dirty="0">
               <a:latin typeface="Garamond" pitchFamily="18" charset="0"/>
@@ -4731,12 +4552,12 @@
             <a:pPr algn="l"/>
             <a:r>
               <a:rPr lang="en-GB" dirty="0" smtClean="0">
-                <a:latin typeface="Quicksand" pitchFamily="18" charset="0"/>
+                <a:latin typeface="Helvetica" pitchFamily="34" charset="0"/>
               </a:rPr>
               <a:t>Performance</a:t>
             </a:r>
             <a:endParaRPr lang="en-GB" dirty="0">
-              <a:latin typeface="Quicksand" pitchFamily="18" charset="0"/>
+              <a:latin typeface="Helvetica" pitchFamily="34" charset="0"/>
             </a:endParaRPr>
           </a:p>
         </p:txBody>
@@ -4931,12 +4752,12 @@
             <a:pPr algn="l"/>
             <a:r>
               <a:rPr lang="en-GB" dirty="0" smtClean="0">
-                <a:latin typeface="Quicksand" pitchFamily="18" charset="0"/>
+                <a:latin typeface="Helvetica" pitchFamily="34" charset="0"/>
               </a:rPr>
               <a:t>Accessibility</a:t>
             </a:r>
             <a:endParaRPr lang="en-GB" dirty="0">
-              <a:latin typeface="Quicksand" pitchFamily="18" charset="0"/>
+              <a:latin typeface="Helvetica" pitchFamily="34" charset="0"/>
             </a:endParaRPr>
           </a:p>
         </p:txBody>
@@ -4971,29 +4792,8 @@
               <a:rPr lang="en-GB" sz="2800" dirty="0" smtClean="0">
                 <a:latin typeface="Garamond" pitchFamily="18" charset="0"/>
               </a:rPr>
-              <a:t>HTML5 </a:t>
-            </a:r>
-            <a:r>
-              <a:rPr lang="en-GB" sz="2800" dirty="0" smtClean="0">
-                <a:latin typeface="Garamond" pitchFamily="18" charset="0"/>
-              </a:rPr>
-              <a:t>video support the &lt;</a:t>
-            </a:r>
-            <a:r>
-              <a:rPr lang="en-GB" sz="2800" dirty="0" smtClean="0">
-                <a:latin typeface="Garamond" pitchFamily="18" charset="0"/>
-              </a:rPr>
-              <a:t>track&gt; tag to specify subtitle </a:t>
-            </a:r>
-            <a:r>
-              <a:rPr lang="en-GB" sz="2800" dirty="0" smtClean="0">
-                <a:latin typeface="Garamond" pitchFamily="18" charset="0"/>
-              </a:rPr>
-              <a:t>tracks</a:t>
-            </a:r>
-            <a:endParaRPr lang="en-GB" sz="2800" dirty="0" smtClean="0">
-              <a:latin typeface="Garamond" pitchFamily="18" charset="0"/>
-            </a:endParaRPr>
+              <a:t>HTML5 video support the &lt;track&gt; tag to specify subtitle tracks</a:t>
+            </a:r>
           </a:p>
           <a:p>
             <a:pPr>
@@ -5004,13 +4804,7 @@
               <a:rPr lang="en-GB" sz="2800" dirty="0" smtClean="0">
                 <a:latin typeface="Garamond" pitchFamily="18" charset="0"/>
               </a:rPr>
-              <a:t>Controls for plug-in based approaches are generally inaccessible to screen </a:t>
-            </a:r>
-            <a:r>
-              <a:rPr lang="en-GB" sz="2800" dirty="0" smtClean="0">
-                <a:latin typeface="Garamond" pitchFamily="18" charset="0"/>
-              </a:rPr>
-              <a:t>readers or confuse them</a:t>
+              <a:t>Controls for plug-in based approaches are generally inaccessible to screen readers or confuse them</a:t>
             </a:r>
           </a:p>
           <a:p>
@@ -5022,43 +4816,7 @@
               <a:rPr lang="en-GB" sz="2800" dirty="0" smtClean="0">
                 <a:latin typeface="Garamond" pitchFamily="18" charset="0"/>
               </a:rPr>
-              <a:t>HTML5 </a:t>
-            </a:r>
-            <a:r>
-              <a:rPr lang="en-GB" sz="2800" dirty="0" smtClean="0">
-                <a:latin typeface="Garamond" pitchFamily="18" charset="0"/>
-              </a:rPr>
-              <a:t>video </a:t>
-            </a:r>
-            <a:r>
-              <a:rPr lang="en-GB" sz="2800" dirty="0" smtClean="0">
-                <a:latin typeface="Garamond" pitchFamily="18" charset="0"/>
-              </a:rPr>
-              <a:t>controls can be made </a:t>
-            </a:r>
-            <a:r>
-              <a:rPr lang="en-GB" sz="2800" dirty="0" smtClean="0">
-                <a:latin typeface="Garamond" pitchFamily="18" charset="0"/>
-              </a:rPr>
-              <a:t>accessible by adding HTML buttons to </a:t>
-            </a:r>
-            <a:r>
-              <a:rPr lang="en-GB" sz="2800" dirty="0" smtClean="0">
-                <a:latin typeface="Garamond" pitchFamily="18" charset="0"/>
-              </a:rPr>
-              <a:t>control </a:t>
-            </a:r>
-            <a:r>
-              <a:rPr lang="en-GB" sz="2800" dirty="0" smtClean="0">
-                <a:latin typeface="Garamond" pitchFamily="18" charset="0"/>
-              </a:rPr>
-              <a:t>the </a:t>
-            </a:r>
-            <a:r>
-              <a:rPr lang="en-GB" sz="2800" dirty="0" smtClean="0">
-                <a:latin typeface="Garamond" pitchFamily="18" charset="0"/>
-              </a:rPr>
-              <a:t>player</a:t>
+              <a:t>HTML5 video controls can be made accessible by adding HTML buttons to control the player</a:t>
             </a:r>
             <a:endParaRPr lang="en-GB" sz="2800" dirty="0">
               <a:latin typeface="Garamond" pitchFamily="18" charset="0"/>
@@ -5206,12 +4964,12 @@
             <a:pPr algn="l"/>
             <a:r>
               <a:rPr lang="en-GB" dirty="0" smtClean="0">
-                <a:latin typeface="Quicksand" pitchFamily="18" charset="0"/>
+                <a:latin typeface="Helvetica" pitchFamily="34" charset="0"/>
               </a:rPr>
               <a:t>Conclusion</a:t>
             </a:r>
             <a:endParaRPr lang="en-GB" dirty="0">
-              <a:latin typeface="Quicksand" pitchFamily="18" charset="0"/>
+              <a:latin typeface="Helvetica" pitchFamily="34" charset="0"/>
             </a:endParaRPr>
           </a:p>
         </p:txBody>
@@ -5246,13 +5004,7 @@
               <a:rPr lang="en-GB" sz="2800" dirty="0" smtClean="0">
                 <a:latin typeface="Garamond" pitchFamily="18" charset="0"/>
               </a:rPr>
-              <a:t>HTML5 video is a viable replacement for plug-in based approaches, albeit with some work still to </a:t>
-            </a:r>
-            <a:r>
-              <a:rPr lang="en-GB" sz="2800" dirty="0" smtClean="0">
-                <a:latin typeface="Garamond" pitchFamily="18" charset="0"/>
-              </a:rPr>
-              <a:t>do</a:t>
+              <a:t>HTML5 video is a viable replacement for plug-in based approaches, albeit with some work still to do</a:t>
             </a:r>
           </a:p>
           <a:p>
@@ -5264,31 +5016,7 @@
               <a:rPr lang="en-GB" sz="2800" dirty="0" smtClean="0">
                 <a:latin typeface="Garamond" pitchFamily="18" charset="0"/>
               </a:rPr>
-              <a:t>Plug-in based approaches are </a:t>
-            </a:r>
-            <a:r>
-              <a:rPr lang="en-GB" sz="2800" dirty="0" smtClean="0">
-                <a:latin typeface="Garamond" pitchFamily="18" charset="0"/>
-              </a:rPr>
-              <a:t>more mature </a:t>
-            </a:r>
-            <a:r>
-              <a:rPr lang="en-GB" sz="2800" dirty="0" smtClean="0">
-                <a:latin typeface="Garamond" pitchFamily="18" charset="0"/>
-              </a:rPr>
-              <a:t>and offer a better experience on desktop </a:t>
-            </a:r>
-            <a:r>
-              <a:rPr lang="en-GB" sz="2800" dirty="0" smtClean="0">
-                <a:latin typeface="Garamond" pitchFamily="18" charset="0"/>
-              </a:rPr>
-              <a:t>web </a:t>
-            </a:r>
-            <a:r>
-              <a:rPr lang="en-GB" sz="2800" dirty="0" smtClean="0">
-                <a:latin typeface="Garamond" pitchFamily="18" charset="0"/>
-              </a:rPr>
-              <a:t>browsers</a:t>
+              <a:t>Plug-in based approaches are more mature and offer a better experience on desktop web browsers</a:t>
             </a:r>
           </a:p>
           <a:p>
@@ -5300,19 +5028,7 @@
               <a:rPr lang="en-GB" sz="2800" dirty="0" smtClean="0">
                 <a:latin typeface="Garamond" pitchFamily="18" charset="0"/>
               </a:rPr>
-              <a:t>HTML5 </a:t>
-            </a:r>
-            <a:r>
-              <a:rPr lang="en-GB" sz="2800" dirty="0" smtClean="0">
-                <a:latin typeface="Garamond" pitchFamily="18" charset="0"/>
-              </a:rPr>
-              <a:t>standardisation efforts </a:t>
-            </a:r>
-            <a:r>
-              <a:rPr lang="en-GB" sz="2800" dirty="0" smtClean="0">
-                <a:latin typeface="Garamond" pitchFamily="18" charset="0"/>
-              </a:rPr>
-              <a:t>must continue</a:t>
+              <a:t>HTML5 standardisation efforts must continue</a:t>
             </a:r>
           </a:p>
           <a:p>
@@ -5324,19 +5040,7 @@
               <a:rPr lang="en-GB" sz="2800" dirty="0" smtClean="0">
                 <a:latin typeface="Garamond" pitchFamily="18" charset="0"/>
               </a:rPr>
-              <a:t>The use </a:t>
-            </a:r>
-            <a:r>
-              <a:rPr lang="en-GB" sz="2800" dirty="0" smtClean="0">
-                <a:latin typeface="Garamond" pitchFamily="18" charset="0"/>
-              </a:rPr>
-              <a:t>of HTML5 video by content providers, such as </a:t>
-            </a:r>
-            <a:r>
-              <a:rPr lang="en-GB" sz="2800" dirty="0" smtClean="0">
-                <a:latin typeface="Garamond" pitchFamily="18" charset="0"/>
-              </a:rPr>
-              <a:t>YouTube, should drive adoption</a:t>
+              <a:t>The use of HTML5 video by content providers, such as YouTube, should drive adoption</a:t>
             </a:r>
             <a:endParaRPr lang="en-GB" sz="2800" dirty="0">
               <a:latin typeface="Garamond" pitchFamily="18" charset="0"/>

</xml_diff>

<commit_message>
Working on poster and slides
</commit_message>
<xml_diff>
--- a/presentation/slides.pptx
+++ b/presentation/slides.pptx
@@ -5,17 +5,16 @@
     <p:sldMasterId id="2147483648" r:id="rId1"/>
   </p:sldMasterIdLst>
   <p:handoutMasterIdLst>
-    <p:handoutMasterId r:id="rId10"/>
+    <p:handoutMasterId r:id="rId9"/>
   </p:handoutMasterIdLst>
   <p:sldIdLst>
     <p:sldId id="256" r:id="rId2"/>
     <p:sldId id="257" r:id="rId3"/>
-    <p:sldId id="258" r:id="rId4"/>
-    <p:sldId id="259" r:id="rId5"/>
-    <p:sldId id="260" r:id="rId6"/>
-    <p:sldId id="261" r:id="rId7"/>
-    <p:sldId id="262" r:id="rId8"/>
-    <p:sldId id="263" r:id="rId9"/>
+    <p:sldId id="259" r:id="rId4"/>
+    <p:sldId id="260" r:id="rId5"/>
+    <p:sldId id="261" r:id="rId6"/>
+    <p:sldId id="262" r:id="rId7"/>
+    <p:sldId id="263" r:id="rId8"/>
   </p:sldIdLst>
   <p:sldSz cx="9144000" cy="6858000" type="screen4x3"/>
   <p:notesSz cx="6858000" cy="9144000"/>
@@ -200,7 +199,7 @@
             <a:fld id="{8F9A1DBC-8C61-41BD-94B9-870336526AAD}" type="datetimeFigureOut">
               <a:rPr lang="en-GB" smtClean="0"/>
               <a:pPr/>
-              <a:t>09/05/2014</a:t>
+              <a:t>12/05/2014</a:t>
             </a:fld>
             <a:endParaRPr lang="en-GB"/>
           </a:p>
@@ -461,7 +460,7 @@
             <a:fld id="{B27620D7-7890-418F-9270-4BAB042765A0}" type="datetimeFigureOut">
               <a:rPr lang="en-GB" smtClean="0"/>
               <a:pPr/>
-              <a:t>09/05/2014</a:t>
+              <a:t>12/05/2014</a:t>
             </a:fld>
             <a:endParaRPr lang="en-GB"/>
           </a:p>
@@ -628,7 +627,7 @@
             <a:fld id="{B27620D7-7890-418F-9270-4BAB042765A0}" type="datetimeFigureOut">
               <a:rPr lang="en-GB" smtClean="0"/>
               <a:pPr/>
-              <a:t>09/05/2014</a:t>
+              <a:t>12/05/2014</a:t>
             </a:fld>
             <a:endParaRPr lang="en-GB"/>
           </a:p>
@@ -805,7 +804,7 @@
             <a:fld id="{B27620D7-7890-418F-9270-4BAB042765A0}" type="datetimeFigureOut">
               <a:rPr lang="en-GB" smtClean="0"/>
               <a:pPr/>
-              <a:t>09/05/2014</a:t>
+              <a:t>12/05/2014</a:t>
             </a:fld>
             <a:endParaRPr lang="en-GB"/>
           </a:p>
@@ -972,7 +971,7 @@
             <a:fld id="{B27620D7-7890-418F-9270-4BAB042765A0}" type="datetimeFigureOut">
               <a:rPr lang="en-GB" smtClean="0"/>
               <a:pPr/>
-              <a:t>09/05/2014</a:t>
+              <a:t>12/05/2014</a:t>
             </a:fld>
             <a:endParaRPr lang="en-GB"/>
           </a:p>
@@ -1215,7 +1214,7 @@
             <a:fld id="{B27620D7-7890-418F-9270-4BAB042765A0}" type="datetimeFigureOut">
               <a:rPr lang="en-GB" smtClean="0"/>
               <a:pPr/>
-              <a:t>09/05/2014</a:t>
+              <a:t>12/05/2014</a:t>
             </a:fld>
             <a:endParaRPr lang="en-GB"/>
           </a:p>
@@ -1500,7 +1499,7 @@
             <a:fld id="{B27620D7-7890-418F-9270-4BAB042765A0}" type="datetimeFigureOut">
               <a:rPr lang="en-GB" smtClean="0"/>
               <a:pPr/>
-              <a:t>09/05/2014</a:t>
+              <a:t>12/05/2014</a:t>
             </a:fld>
             <a:endParaRPr lang="en-GB"/>
           </a:p>
@@ -1919,7 +1918,7 @@
             <a:fld id="{B27620D7-7890-418F-9270-4BAB042765A0}" type="datetimeFigureOut">
               <a:rPr lang="en-GB" smtClean="0"/>
               <a:pPr/>
-              <a:t>09/05/2014</a:t>
+              <a:t>12/05/2014</a:t>
             </a:fld>
             <a:endParaRPr lang="en-GB"/>
           </a:p>
@@ -2034,7 +2033,7 @@
             <a:fld id="{B27620D7-7890-418F-9270-4BAB042765A0}" type="datetimeFigureOut">
               <a:rPr lang="en-GB" smtClean="0"/>
               <a:pPr/>
-              <a:t>09/05/2014</a:t>
+              <a:t>12/05/2014</a:t>
             </a:fld>
             <a:endParaRPr lang="en-GB"/>
           </a:p>
@@ -2126,7 +2125,7 @@
             <a:fld id="{B27620D7-7890-418F-9270-4BAB042765A0}" type="datetimeFigureOut">
               <a:rPr lang="en-GB" smtClean="0"/>
               <a:pPr/>
-              <a:t>09/05/2014</a:t>
+              <a:t>12/05/2014</a:t>
             </a:fld>
             <a:endParaRPr lang="en-GB"/>
           </a:p>
@@ -2400,7 +2399,7 @@
             <a:fld id="{B27620D7-7890-418F-9270-4BAB042765A0}" type="datetimeFigureOut">
               <a:rPr lang="en-GB" smtClean="0"/>
               <a:pPr/>
-              <a:t>09/05/2014</a:t>
+              <a:t>12/05/2014</a:t>
             </a:fld>
             <a:endParaRPr lang="en-GB"/>
           </a:p>
@@ -2650,7 +2649,7 @@
             <a:fld id="{B27620D7-7890-418F-9270-4BAB042765A0}" type="datetimeFigureOut">
               <a:rPr lang="en-GB" smtClean="0"/>
               <a:pPr/>
-              <a:t>09/05/2014</a:t>
+              <a:t>12/05/2014</a:t>
             </a:fld>
             <a:endParaRPr lang="en-GB"/>
           </a:p>
@@ -2860,7 +2859,7 @@
             <a:fld id="{B27620D7-7890-418F-9270-4BAB042765A0}" type="datetimeFigureOut">
               <a:rPr lang="en-GB" smtClean="0"/>
               <a:pPr/>
-              <a:t>09/05/2014</a:t>
+              <a:t>12/05/2014</a:t>
             </a:fld>
             <a:endParaRPr lang="en-GB"/>
           </a:p>
@@ -3490,7 +3489,7 @@
         <p:spPr>
           <a:xfrm>
             <a:off x="0" y="1556792"/>
-            <a:ext cx="8748464" cy="4608512"/>
+            <a:ext cx="8748464" cy="3600400"/>
           </a:xfrm>
           <a:prstGeom prst="rect">
             <a:avLst/>
@@ -3726,7 +3725,7 @@
         <p:spPr>
           <a:xfrm>
             <a:off x="0" y="1556792"/>
-            <a:ext cx="8748464" cy="4608512"/>
+            <a:ext cx="8748464" cy="3168352"/>
           </a:xfrm>
           <a:prstGeom prst="rect">
             <a:avLst/>
@@ -3834,7 +3833,7 @@
               <a:rPr lang="en-GB" dirty="0" smtClean="0">
                 <a:latin typeface="Helvetica" pitchFamily="34" charset="0"/>
               </a:rPr>
-              <a:t>Embedding Video</a:t>
+              <a:t>Streaming Video</a:t>
             </a:r>
             <a:endParaRPr lang="en-GB" dirty="0">
               <a:latin typeface="Helvetica" pitchFamily="34" charset="0"/>
@@ -3872,7 +3871,7 @@
               <a:rPr lang="en-GB" sz="2800" dirty="0" smtClean="0">
                 <a:latin typeface="Garamond" pitchFamily="18" charset="0"/>
               </a:rPr>
-              <a:t>Plug-in approaches render content in a black box and can have problems with missing plug-ins</a:t>
+              <a:t>Push or pull-based methods</a:t>
             </a:r>
           </a:p>
           <a:p>
@@ -3884,7 +3883,13 @@
               <a:rPr lang="en-GB" sz="2800" dirty="0" smtClean="0">
                 <a:latin typeface="Garamond" pitchFamily="18" charset="0"/>
               </a:rPr>
-              <a:t>HTML5 video solves these problems</a:t>
+              <a:t>Plug-in based approaches use </a:t>
+            </a:r>
+            <a:r>
+              <a:rPr lang="en-GB" sz="2800" dirty="0" smtClean="0">
+                <a:latin typeface="Garamond" pitchFamily="18" charset="0"/>
+              </a:rPr>
+              <a:t>both</a:t>
             </a:r>
           </a:p>
           <a:p>
@@ -3896,7 +3901,7 @@
               <a:rPr lang="en-GB" sz="2800" dirty="0" smtClean="0">
                 <a:latin typeface="Garamond" pitchFamily="18" charset="0"/>
               </a:rPr>
-              <a:t>HTML5 video does not specify which formats should be supported, leading to differences between implementations</a:t>
+              <a:t>HTML5 video typically uses pull-based</a:t>
             </a:r>
           </a:p>
           <a:p>
@@ -3908,9 +3913,33 @@
               <a:rPr lang="en-GB" sz="2800" dirty="0" smtClean="0">
                 <a:latin typeface="Garamond" pitchFamily="18" charset="0"/>
               </a:rPr>
-              <a:t>Developers can define multiple ‘sources’ for each video</a:t>
-            </a:r>
-            <a:endParaRPr lang="en-GB" dirty="0">
+              <a:t>Both </a:t>
+            </a:r>
+            <a:r>
+              <a:rPr lang="en-GB" sz="2800" dirty="0" smtClean="0">
+                <a:latin typeface="Garamond" pitchFamily="18" charset="0"/>
+              </a:rPr>
+              <a:t>methods support adaptive streaming</a:t>
+            </a:r>
+          </a:p>
+          <a:p>
+            <a:pPr>
+              <a:buFont typeface="Garamond" pitchFamily="18" charset="0"/>
+              <a:buChar char="−"/>
+            </a:pPr>
+            <a:r>
+              <a:rPr lang="en-GB" sz="2800" dirty="0" smtClean="0">
+                <a:latin typeface="Garamond" pitchFamily="18" charset="0"/>
+              </a:rPr>
+              <a:t>On-demand media and live media </a:t>
+            </a:r>
+            <a:r>
+              <a:rPr lang="en-GB" sz="2800" dirty="0" smtClean="0">
+                <a:latin typeface="Garamond" pitchFamily="18" charset="0"/>
+              </a:rPr>
+              <a:t>are supported by both plug-in and HTML5 video approaches</a:t>
+            </a:r>
+            <a:endParaRPr lang="en-GB" sz="2800" dirty="0" smtClean="0">
               <a:latin typeface="Garamond" pitchFamily="18" charset="0"/>
             </a:endParaRPr>
           </a:p>
@@ -3950,7 +3979,7 @@
         <p:spPr>
           <a:xfrm>
             <a:off x="0" y="1556792"/>
-            <a:ext cx="8748464" cy="4608512"/>
+            <a:ext cx="8748464" cy="3528392"/>
           </a:xfrm>
           <a:prstGeom prst="rect">
             <a:avLst/>
@@ -4058,7 +4087,7 @@
               <a:rPr lang="en-GB" dirty="0" smtClean="0">
                 <a:latin typeface="Helvetica" pitchFamily="34" charset="0"/>
               </a:rPr>
-              <a:t>Streaming Video</a:t>
+              <a:t>Content Protection</a:t>
             </a:r>
             <a:endParaRPr lang="en-GB" dirty="0">
               <a:latin typeface="Helvetica" pitchFamily="34" charset="0"/>
@@ -4096,7 +4125,7 @@
               <a:rPr lang="en-GB" sz="2800" dirty="0" smtClean="0">
                 <a:latin typeface="Garamond" pitchFamily="18" charset="0"/>
               </a:rPr>
-              <a:t>Push or pull-based methods</a:t>
+              <a:t>Delivered video content can be captured</a:t>
             </a:r>
           </a:p>
           <a:p>
@@ -4108,7 +4137,7 @@
               <a:rPr lang="en-GB" sz="2800" dirty="0" smtClean="0">
                 <a:latin typeface="Garamond" pitchFamily="18" charset="0"/>
               </a:rPr>
-              <a:t>Plug-in based approaches use both</a:t>
+              <a:t>Methods exist to try and prevent this</a:t>
             </a:r>
           </a:p>
           <a:p>
@@ -4120,7 +4149,7 @@
               <a:rPr lang="en-GB" sz="2800" dirty="0" smtClean="0">
                 <a:latin typeface="Garamond" pitchFamily="18" charset="0"/>
               </a:rPr>
-              <a:t>HTML5 video typically uses pull-based</a:t>
+              <a:t>If a user captures the video DRM technologies can be used to prevent playback</a:t>
             </a:r>
           </a:p>
           <a:p>
@@ -4132,7 +4161,7 @@
               <a:rPr lang="en-GB" sz="2800" dirty="0" smtClean="0">
                 <a:latin typeface="Garamond" pitchFamily="18" charset="0"/>
               </a:rPr>
-              <a:t>Both methods support adaptive streaming</a:t>
+              <a:t>HTML5 does not specify a DRM system</a:t>
             </a:r>
           </a:p>
           <a:p>
@@ -4144,20 +4173,11 @@
               <a:rPr lang="en-GB" sz="2800" dirty="0" smtClean="0">
                 <a:latin typeface="Garamond" pitchFamily="18" charset="0"/>
               </a:rPr>
-              <a:t>On-demand media and live media should be supported</a:t>
-            </a:r>
-          </a:p>
-          <a:p>
-            <a:pPr>
-              <a:buFont typeface="Garamond" pitchFamily="18" charset="0"/>
-              <a:buChar char="−"/>
-            </a:pPr>
-            <a:r>
-              <a:rPr lang="en-GB" sz="2800" dirty="0" smtClean="0">
-                <a:latin typeface="Garamond" pitchFamily="18" charset="0"/>
-              </a:rPr>
-              <a:t>Solutions exist for both plug-in based and HTML 5 video approaches</a:t>
-            </a:r>
+              <a:t>Encrypted Media Extensions (EME) will provide a common API to interact with DRM systems</a:t>
+            </a:r>
+            <a:endParaRPr lang="en-GB" sz="2800" dirty="0">
+              <a:latin typeface="Garamond" pitchFamily="18" charset="0"/>
+            </a:endParaRPr>
           </a:p>
         </p:txBody>
       </p:sp>
@@ -4195,7 +4215,7 @@
         <p:spPr>
           <a:xfrm>
             <a:off x="0" y="1556792"/>
-            <a:ext cx="8748464" cy="4608512"/>
+            <a:ext cx="8748464" cy="3096344"/>
           </a:xfrm>
           <a:prstGeom prst="rect">
             <a:avLst/>
@@ -4303,7 +4323,7 @@
               <a:rPr lang="en-GB" dirty="0" smtClean="0">
                 <a:latin typeface="Helvetica" pitchFamily="34" charset="0"/>
               </a:rPr>
-              <a:t>Content Protection</a:t>
+              <a:t>Performance</a:t>
             </a:r>
             <a:endParaRPr lang="en-GB" dirty="0">
               <a:latin typeface="Helvetica" pitchFamily="34" charset="0"/>
@@ -4329,7 +4349,7 @@
         </p:spPr>
         <p:txBody>
           <a:bodyPr>
-            <a:noAutofit/>
+            <a:normAutofit/>
           </a:bodyPr>
           <a:lstStyle/>
           <a:p>
@@ -4341,7 +4361,7 @@
               <a:rPr lang="en-GB" sz="2800" dirty="0" smtClean="0">
                 <a:latin typeface="Garamond" pitchFamily="18" charset="0"/>
               </a:rPr>
-              <a:t>Delivered video content can be captured</a:t>
+              <a:t>More mobile devices will be used to play video</a:t>
             </a:r>
           </a:p>
           <a:p>
@@ -4353,7 +4373,7 @@
               <a:rPr lang="en-GB" sz="2800" dirty="0" smtClean="0">
                 <a:latin typeface="Garamond" pitchFamily="18" charset="0"/>
               </a:rPr>
-              <a:t>Methods exist to try and prevent this</a:t>
+              <a:t>Such devices are less powerful and it is important that watching HTML5 video is efficient</a:t>
             </a:r>
           </a:p>
           <a:p>
@@ -4365,7 +4385,7 @@
               <a:rPr lang="en-GB" sz="2800" dirty="0" smtClean="0">
                 <a:latin typeface="Garamond" pitchFamily="18" charset="0"/>
               </a:rPr>
-              <a:t>If a user captures the video DRM technologies can be used to prevent playback</a:t>
+              <a:t>Conflicting research into performance differences between Flash and HTML5 video</a:t>
             </a:r>
           </a:p>
           <a:p>
@@ -4377,19 +4397,7 @@
               <a:rPr lang="en-GB" sz="2800" dirty="0" smtClean="0">
                 <a:latin typeface="Garamond" pitchFamily="18" charset="0"/>
               </a:rPr>
-              <a:t>HTML5 does not specify a DRM system</a:t>
-            </a:r>
-          </a:p>
-          <a:p>
-            <a:pPr>
-              <a:buFont typeface="Garamond" pitchFamily="18" charset="0"/>
-              <a:buChar char="−"/>
-            </a:pPr>
-            <a:r>
-              <a:rPr lang="en-GB" sz="2800" dirty="0" smtClean="0">
-                <a:latin typeface="Garamond" pitchFamily="18" charset="0"/>
-              </a:rPr>
-              <a:t>Encrypted Media Extensions (EME) will provide a common API to interact with DRM systems</a:t>
+              <a:t>Varies between browsers</a:t>
             </a:r>
             <a:endParaRPr lang="en-GB" sz="2800" dirty="0">
               <a:latin typeface="Garamond" pitchFamily="18" charset="0"/>
@@ -4431,7 +4439,7 @@
         <p:spPr>
           <a:xfrm>
             <a:off x="0" y="1556792"/>
-            <a:ext cx="8748464" cy="4608512"/>
+            <a:ext cx="8748464" cy="4824536"/>
           </a:xfrm>
           <a:prstGeom prst="rect">
             <a:avLst/>
@@ -4539,7 +4547,7 @@
               <a:rPr lang="en-GB" dirty="0" smtClean="0">
                 <a:latin typeface="Helvetica" pitchFamily="34" charset="0"/>
               </a:rPr>
-              <a:t>Performance</a:t>
+              <a:t>Accessibility</a:t>
             </a:r>
             <a:endParaRPr lang="en-GB" dirty="0">
               <a:latin typeface="Helvetica" pitchFamily="34" charset="0"/>
@@ -4565,7 +4573,7 @@
         </p:spPr>
         <p:txBody>
           <a:bodyPr>
-            <a:normAutofit/>
+            <a:noAutofit/>
           </a:bodyPr>
           <a:lstStyle/>
           <a:p>
@@ -4577,7 +4585,43 @@
               <a:rPr lang="en-GB" sz="2800" dirty="0" smtClean="0">
                 <a:latin typeface="Garamond" pitchFamily="18" charset="0"/>
               </a:rPr>
-              <a:t>More mobile devices will be used to play video</a:t>
+              <a:t>HTML5 </a:t>
+            </a:r>
+            <a:r>
+              <a:rPr lang="en-GB" sz="2800" dirty="0" smtClean="0">
+                <a:latin typeface="Garamond" pitchFamily="18" charset="0"/>
+              </a:rPr>
+              <a:t>video </a:t>
+            </a:r>
+            <a:r>
+              <a:rPr lang="en-GB" sz="2800" dirty="0" smtClean="0">
+                <a:latin typeface="Garamond" pitchFamily="18" charset="0"/>
+              </a:rPr>
+              <a:t>uses</a:t>
+            </a:r>
+            <a:r>
+              <a:rPr lang="en-GB" sz="2800" dirty="0" smtClean="0">
+                <a:latin typeface="Garamond" pitchFamily="18" charset="0"/>
+              </a:rPr>
+              <a:t> </a:t>
+            </a:r>
+            <a:r>
+              <a:rPr lang="en-GB" sz="2800" dirty="0" smtClean="0">
+                <a:latin typeface="Garamond" pitchFamily="18" charset="0"/>
+              </a:rPr>
+              <a:t>the &lt;track&gt; tag to </a:t>
+            </a:r>
+            <a:r>
+              <a:rPr lang="en-GB" sz="2800" dirty="0" smtClean="0">
+                <a:latin typeface="Garamond" pitchFamily="18" charset="0"/>
+              </a:rPr>
+              <a:t>add subtitle </a:t>
+            </a:r>
+            <a:r>
+              <a:rPr lang="en-GB" sz="2800" dirty="0" smtClean="0">
+                <a:latin typeface="Garamond" pitchFamily="18" charset="0"/>
+              </a:rPr>
+              <a:t>tracks</a:t>
             </a:r>
           </a:p>
           <a:p>
@@ -4589,29 +4633,8 @@
               <a:rPr lang="en-GB" sz="2800" dirty="0" smtClean="0">
                 <a:latin typeface="Garamond" pitchFamily="18" charset="0"/>
               </a:rPr>
-              <a:t>Such devices are less </a:t>
-            </a:r>
-            <a:r>
-              <a:rPr lang="en-GB" sz="2800" dirty="0" smtClean="0">
-                <a:latin typeface="Garamond" pitchFamily="18" charset="0"/>
-              </a:rPr>
-              <a:t>powerful and it is important </a:t>
-            </a:r>
-            <a:r>
-              <a:rPr lang="en-GB" sz="2800" dirty="0" smtClean="0">
-                <a:latin typeface="Garamond" pitchFamily="18" charset="0"/>
-              </a:rPr>
-              <a:t>that watching HTML5 </a:t>
-            </a:r>
-            <a:r>
-              <a:rPr lang="en-GB" sz="2800" dirty="0" smtClean="0">
-                <a:latin typeface="Garamond" pitchFamily="18" charset="0"/>
-              </a:rPr>
-              <a:t>video is efficient</a:t>
-            </a:r>
-            <a:endParaRPr lang="en-GB" sz="2800" dirty="0" smtClean="0">
-              <a:latin typeface="Garamond" pitchFamily="18" charset="0"/>
-            </a:endParaRPr>
+              <a:t>Controls for plug-in based approaches are generally inaccessible to screen readers or confuse them</a:t>
+            </a:r>
           </a:p>
           <a:p>
             <a:pPr>
@@ -4622,25 +4645,99 @@
               <a:rPr lang="en-GB" sz="2800" dirty="0" smtClean="0">
                 <a:latin typeface="Garamond" pitchFamily="18" charset="0"/>
               </a:rPr>
-              <a:t>Conflicting </a:t>
+              <a:t>HTML5 video </a:t>
             </a:r>
             <a:r>
               <a:rPr lang="en-GB" sz="2800" dirty="0" smtClean="0">
                 <a:latin typeface="Garamond" pitchFamily="18" charset="0"/>
               </a:rPr>
-              <a:t>research into performance differences between Flash and HTML5 video</a:t>
-            </a:r>
-          </a:p>
-          <a:p>
-            <a:pPr>
-              <a:buFont typeface="Garamond" pitchFamily="18" charset="0"/>
-              <a:buChar char="−"/>
-            </a:pPr>
-            <a:r>
+              <a:t>controls</a:t>
+            </a:r>
+            <a:br>
               <a:rPr lang="en-GB" sz="2800" dirty="0" smtClean="0">
                 <a:latin typeface="Garamond" pitchFamily="18" charset="0"/>
               </a:rPr>
-              <a:t>Varies between browsers</a:t>
+            </a:br>
+            <a:r>
+              <a:rPr lang="en-GB" sz="2800" dirty="0" smtClean="0">
+                <a:latin typeface="Garamond" pitchFamily="18" charset="0"/>
+              </a:rPr>
+              <a:t>can </a:t>
+            </a:r>
+            <a:r>
+              <a:rPr lang="en-GB" sz="2800" dirty="0" smtClean="0">
+                <a:latin typeface="Garamond" pitchFamily="18" charset="0"/>
+              </a:rPr>
+              <a:t>be made </a:t>
+            </a:r>
+            <a:r>
+              <a:rPr lang="en-GB" sz="2800" dirty="0" smtClean="0">
+                <a:latin typeface="Garamond" pitchFamily="18" charset="0"/>
+              </a:rPr>
+              <a:t>accessible</a:t>
+            </a:r>
+            <a:br>
+              <a:rPr lang="en-GB" sz="2800" dirty="0" smtClean="0">
+                <a:latin typeface="Garamond" pitchFamily="18" charset="0"/>
+              </a:rPr>
+            </a:br>
+            <a:r>
+              <a:rPr lang="en-GB" sz="2800" dirty="0" smtClean="0">
+                <a:latin typeface="Garamond" pitchFamily="18" charset="0"/>
+              </a:rPr>
+              <a:t>by </a:t>
+            </a:r>
+            <a:r>
+              <a:rPr lang="en-GB" sz="2800" dirty="0" smtClean="0">
+                <a:latin typeface="Garamond" pitchFamily="18" charset="0"/>
+              </a:rPr>
+              <a:t>adding </a:t>
+            </a:r>
+            <a:r>
+              <a:rPr lang="en-GB" sz="2800" dirty="0" smtClean="0">
+                <a:latin typeface="Garamond" pitchFamily="18" charset="0"/>
+              </a:rPr>
+              <a:t>HTML</a:t>
+            </a:r>
+            <a:br>
+              <a:rPr lang="en-GB" sz="2800" dirty="0" smtClean="0">
+                <a:latin typeface="Garamond" pitchFamily="18" charset="0"/>
+              </a:rPr>
+            </a:br>
+            <a:r>
+              <a:rPr lang="en-GB" sz="2800" dirty="0" smtClean="0">
+                <a:latin typeface="Garamond" pitchFamily="18" charset="0"/>
+              </a:rPr>
+              <a:t>buttons </a:t>
+            </a:r>
+            <a:r>
+              <a:rPr lang="en-GB" sz="2800" dirty="0" smtClean="0">
+                <a:latin typeface="Garamond" pitchFamily="18" charset="0"/>
+              </a:rPr>
+              <a:t>to </a:t>
+            </a:r>
+            <a:r>
+              <a:rPr lang="en-GB" sz="2800" dirty="0" smtClean="0">
+                <a:latin typeface="Garamond" pitchFamily="18" charset="0"/>
+              </a:rPr>
+              <a:t>control</a:t>
+            </a:r>
+            <a:br>
+              <a:rPr lang="en-GB" sz="2800" dirty="0" smtClean="0">
+                <a:latin typeface="Garamond" pitchFamily="18" charset="0"/>
+              </a:rPr>
+            </a:br>
+            <a:r>
+              <a:rPr lang="en-GB" sz="2800" dirty="0" smtClean="0">
+                <a:latin typeface="Garamond" pitchFamily="18" charset="0"/>
+              </a:rPr>
+              <a:t>the </a:t>
+            </a:r>
+            <a:r>
+              <a:rPr lang="en-GB" sz="2800" dirty="0" smtClean="0">
+                <a:latin typeface="Garamond" pitchFamily="18" charset="0"/>
+              </a:rPr>
+              <a:t>player</a:t>
             </a:r>
             <a:endParaRPr lang="en-GB" sz="2800" dirty="0">
               <a:latin typeface="Garamond" pitchFamily="18" charset="0"/>
@@ -4648,6 +4745,38 @@
           </a:p>
         </p:txBody>
       </p:sp>
+      <p:pic>
+        <p:nvPicPr>
+          <p:cNvPr id="1026" name="Picture 2"/>
+          <p:cNvPicPr>
+            <a:picLocks noChangeAspect="1" noChangeArrowheads="1"/>
+          </p:cNvPicPr>
+          <p:nvPr/>
+        </p:nvPicPr>
+        <p:blipFill>
+          <a:blip r:embed="rId2" cstate="print"/>
+          <a:srcRect/>
+          <a:stretch>
+            <a:fillRect/>
+          </a:stretch>
+        </p:blipFill>
+        <p:spPr bwMode="auto">
+          <a:xfrm>
+            <a:off x="4211960" y="3645024"/>
+            <a:ext cx="4355975" cy="2629782"/>
+          </a:xfrm>
+          <a:prstGeom prst="rect">
+            <a:avLst/>
+          </a:prstGeom>
+          <a:noFill/>
+          <a:ln w="9525">
+            <a:noFill/>
+            <a:miter lim="800000"/>
+            <a:headEnd/>
+            <a:tailEnd/>
+          </a:ln>
+        </p:spPr>
+      </p:pic>
     </p:spTree>
   </p:cSld>
   <p:clrMapOvr>
@@ -4682,219 +4811,7 @@
         <p:spPr>
           <a:xfrm>
             <a:off x="0" y="1556792"/>
-            <a:ext cx="8748464" cy="4608512"/>
-          </a:xfrm>
-          <a:prstGeom prst="rect">
-            <a:avLst/>
-          </a:prstGeom>
-          <a:solidFill>
-            <a:srgbClr val="D3EDF1"/>
-          </a:solidFill>
-          <a:ln>
-            <a:noFill/>
-          </a:ln>
-        </p:spPr>
-        <p:style>
-          <a:lnRef idx="2">
-            <a:schemeClr val="accent1">
-              <a:shade val="50000"/>
-            </a:schemeClr>
-          </a:lnRef>
-          <a:fillRef idx="1">
-            <a:schemeClr val="accent1"/>
-          </a:fillRef>
-          <a:effectRef idx="0">
-            <a:schemeClr val="accent1"/>
-          </a:effectRef>
-          <a:fontRef idx="minor">
-            <a:schemeClr val="lt1"/>
-          </a:fontRef>
-        </p:style>
-        <p:txBody>
-          <a:bodyPr rtlCol="0" anchor="ctr"/>
-          <a:lstStyle/>
-          <a:p>
-            <a:pPr algn="ctr"/>
-            <a:endParaRPr lang="en-GB"/>
-          </a:p>
-        </p:txBody>
-      </p:sp>
-      <p:sp>
-        <p:nvSpPr>
-          <p:cNvPr id="4" name="Rectangle 3"/>
-          <p:cNvSpPr/>
-          <p:nvPr/>
-        </p:nvSpPr>
-        <p:spPr>
-          <a:xfrm>
-            <a:off x="0" y="404664"/>
-            <a:ext cx="6804248" cy="936104"/>
-          </a:xfrm>
-          <a:prstGeom prst="rect">
-            <a:avLst/>
-          </a:prstGeom>
-          <a:solidFill>
-            <a:srgbClr val="D3EDF1"/>
-          </a:solidFill>
-          <a:ln>
-            <a:noFill/>
-          </a:ln>
-        </p:spPr>
-        <p:style>
-          <a:lnRef idx="2">
-            <a:schemeClr val="accent1">
-              <a:shade val="50000"/>
-            </a:schemeClr>
-          </a:lnRef>
-          <a:fillRef idx="1">
-            <a:schemeClr val="accent1"/>
-          </a:fillRef>
-          <a:effectRef idx="0">
-            <a:schemeClr val="accent1"/>
-          </a:effectRef>
-          <a:fontRef idx="minor">
-            <a:schemeClr val="lt1"/>
-          </a:fontRef>
-        </p:style>
-        <p:txBody>
-          <a:bodyPr rtlCol="0" anchor="ctr"/>
-          <a:lstStyle/>
-          <a:p>
-            <a:pPr algn="ctr"/>
-            <a:endParaRPr lang="en-GB"/>
-          </a:p>
-        </p:txBody>
-      </p:sp>
-      <p:sp>
-        <p:nvSpPr>
-          <p:cNvPr id="2" name="Title 1"/>
-          <p:cNvSpPr>
-            <a:spLocks noGrp="1"/>
-          </p:cNvSpPr>
-          <p:nvPr>
-            <p:ph type="title"/>
-          </p:nvPr>
-        </p:nvSpPr>
-        <p:spPr>
-          <a:xfrm>
-            <a:off x="302840" y="274638"/>
-            <a:ext cx="8229600" cy="1143000"/>
-          </a:xfrm>
-        </p:spPr>
-        <p:txBody>
-          <a:bodyPr/>
-          <a:lstStyle/>
-          <a:p>
-            <a:pPr algn="l"/>
-            <a:r>
-              <a:rPr lang="en-GB" dirty="0" smtClean="0">
-                <a:latin typeface="Helvetica" pitchFamily="34" charset="0"/>
-              </a:rPr>
-              <a:t>Accessibility</a:t>
-            </a:r>
-            <a:endParaRPr lang="en-GB" dirty="0">
-              <a:latin typeface="Helvetica" pitchFamily="34" charset="0"/>
-            </a:endParaRPr>
-          </a:p>
-        </p:txBody>
-      </p:sp>
-      <p:sp>
-        <p:nvSpPr>
-          <p:cNvPr id="3" name="Content Placeholder 2"/>
-          <p:cNvSpPr>
-            <a:spLocks noGrp="1"/>
-          </p:cNvSpPr>
-          <p:nvPr>
-            <p:ph idx="1"/>
-          </p:nvPr>
-        </p:nvSpPr>
-        <p:spPr>
-          <a:xfrm>
-            <a:off x="374848" y="1600200"/>
-            <a:ext cx="8229600" cy="4525963"/>
-          </a:xfrm>
-        </p:spPr>
-        <p:txBody>
-          <a:bodyPr>
-            <a:noAutofit/>
-          </a:bodyPr>
-          <a:lstStyle/>
-          <a:p>
-            <a:pPr>
-              <a:buFont typeface="Garamond" pitchFamily="18" charset="0"/>
-              <a:buChar char="−"/>
-            </a:pPr>
-            <a:r>
-              <a:rPr lang="en-GB" sz="2800" dirty="0" smtClean="0">
-                <a:latin typeface="Garamond" pitchFamily="18" charset="0"/>
-              </a:rPr>
-              <a:t>HTML5 video support the &lt;track&gt; tag to specify subtitle tracks</a:t>
-            </a:r>
-          </a:p>
-          <a:p>
-            <a:pPr>
-              <a:buFont typeface="Garamond" pitchFamily="18" charset="0"/>
-              <a:buChar char="−"/>
-            </a:pPr>
-            <a:r>
-              <a:rPr lang="en-GB" sz="2800" dirty="0" smtClean="0">
-                <a:latin typeface="Garamond" pitchFamily="18" charset="0"/>
-              </a:rPr>
-              <a:t>Controls for plug-in based approaches are generally inaccessible to screen readers or confuse them</a:t>
-            </a:r>
-          </a:p>
-          <a:p>
-            <a:pPr>
-              <a:buFont typeface="Garamond" pitchFamily="18" charset="0"/>
-              <a:buChar char="−"/>
-            </a:pPr>
-            <a:r>
-              <a:rPr lang="en-GB" sz="2800" dirty="0" smtClean="0">
-                <a:latin typeface="Garamond" pitchFamily="18" charset="0"/>
-              </a:rPr>
-              <a:t>HTML5 video controls can be made accessible by adding HTML buttons to control the player</a:t>
-            </a:r>
-            <a:endParaRPr lang="en-GB" sz="2800" dirty="0">
-              <a:latin typeface="Garamond" pitchFamily="18" charset="0"/>
-            </a:endParaRPr>
-          </a:p>
-        </p:txBody>
-      </p:sp>
-    </p:spTree>
-  </p:cSld>
-  <p:clrMapOvr>
-    <a:masterClrMapping/>
-  </p:clrMapOvr>
-</p:sld>
-</file>
-
-<file path=ppt/slides/slide8.xml><?xml version="1.0" encoding="utf-8"?>
-<p:sld xmlns:a="http://schemas.openxmlformats.org/drawingml/2006/main" xmlns:r="http://schemas.openxmlformats.org/officeDocument/2006/relationships" xmlns:p="http://schemas.openxmlformats.org/presentationml/2006/main">
-  <p:cSld>
-    <p:spTree>
-      <p:nvGrpSpPr>
-        <p:cNvPr id="1" name=""/>
-        <p:cNvGrpSpPr/>
-        <p:nvPr/>
-      </p:nvGrpSpPr>
-      <p:grpSpPr>
-        <a:xfrm>
-          <a:off x="0" y="0"/>
-          <a:ext cx="0" cy="0"/>
-          <a:chOff x="0" y="0"/>
-          <a:chExt cx="0" cy="0"/>
-        </a:xfrm>
-      </p:grpSpPr>
-      <p:sp>
-        <p:nvSpPr>
-          <p:cNvPr id="5" name="Rectangle 4"/>
-          <p:cNvSpPr/>
-          <p:nvPr/>
-        </p:nvSpPr>
-        <p:spPr>
-          <a:xfrm>
-            <a:off x="0" y="1556792"/>
-            <a:ext cx="8748464" cy="4608512"/>
+            <a:ext cx="8748464" cy="3528392"/>
           </a:xfrm>
           <a:prstGeom prst="rect">
             <a:avLst/>

</xml_diff>